<commit_message>
arq ll e hl atualizados
</commit_message>
<xml_diff>
--- a/Professor Alex Barreira/Arquitetura HL e LV incubadora.pptx
+++ b/Professor Alex Barreira/Arquitetura HL e LV incubadora.pptx
@@ -244,7 +244,7 @@
           <a:p>
             <a:fld id="{24DC6F6F-C09A-4FB7-97E3-78F353222510}" type="datetimeFigureOut">
               <a:rPr lang="pt-BR" smtClean="0"/>
-              <a:t>17/09/2018</a:t>
+              <a:t>18/09/2018</a:t>
             </a:fld>
             <a:endParaRPr lang="pt-BR"/>
           </a:p>
@@ -412,7 +412,7 @@
           <a:p>
             <a:fld id="{24DC6F6F-C09A-4FB7-97E3-78F353222510}" type="datetimeFigureOut">
               <a:rPr lang="pt-BR" smtClean="0"/>
-              <a:t>17/09/2018</a:t>
+              <a:t>18/09/2018</a:t>
             </a:fld>
             <a:endParaRPr lang="pt-BR"/>
           </a:p>
@@ -590,7 +590,7 @@
           <a:p>
             <a:fld id="{24DC6F6F-C09A-4FB7-97E3-78F353222510}" type="datetimeFigureOut">
               <a:rPr lang="pt-BR" smtClean="0"/>
-              <a:t>17/09/2018</a:t>
+              <a:t>18/09/2018</a:t>
             </a:fld>
             <a:endParaRPr lang="pt-BR"/>
           </a:p>
@@ -758,7 +758,7 @@
           <a:p>
             <a:fld id="{24DC6F6F-C09A-4FB7-97E3-78F353222510}" type="datetimeFigureOut">
               <a:rPr lang="pt-BR" smtClean="0"/>
-              <a:t>17/09/2018</a:t>
+              <a:t>18/09/2018</a:t>
             </a:fld>
             <a:endParaRPr lang="pt-BR"/>
           </a:p>
@@ -1003,7 +1003,7 @@
           <a:p>
             <a:fld id="{24DC6F6F-C09A-4FB7-97E3-78F353222510}" type="datetimeFigureOut">
               <a:rPr lang="pt-BR" smtClean="0"/>
-              <a:t>17/09/2018</a:t>
+              <a:t>18/09/2018</a:t>
             </a:fld>
             <a:endParaRPr lang="pt-BR"/>
           </a:p>
@@ -1232,7 +1232,7 @@
           <a:p>
             <a:fld id="{24DC6F6F-C09A-4FB7-97E3-78F353222510}" type="datetimeFigureOut">
               <a:rPr lang="pt-BR" smtClean="0"/>
-              <a:t>17/09/2018</a:t>
+              <a:t>18/09/2018</a:t>
             </a:fld>
             <a:endParaRPr lang="pt-BR"/>
           </a:p>
@@ -1596,7 +1596,7 @@
           <a:p>
             <a:fld id="{24DC6F6F-C09A-4FB7-97E3-78F353222510}" type="datetimeFigureOut">
               <a:rPr lang="pt-BR" smtClean="0"/>
-              <a:t>17/09/2018</a:t>
+              <a:t>18/09/2018</a:t>
             </a:fld>
             <a:endParaRPr lang="pt-BR"/>
           </a:p>
@@ -1713,7 +1713,7 @@
           <a:p>
             <a:fld id="{24DC6F6F-C09A-4FB7-97E3-78F353222510}" type="datetimeFigureOut">
               <a:rPr lang="pt-BR" smtClean="0"/>
-              <a:t>17/09/2018</a:t>
+              <a:t>18/09/2018</a:t>
             </a:fld>
             <a:endParaRPr lang="pt-BR"/>
           </a:p>
@@ -1808,7 +1808,7 @@
           <a:p>
             <a:fld id="{24DC6F6F-C09A-4FB7-97E3-78F353222510}" type="datetimeFigureOut">
               <a:rPr lang="pt-BR" smtClean="0"/>
-              <a:t>17/09/2018</a:t>
+              <a:t>18/09/2018</a:t>
             </a:fld>
             <a:endParaRPr lang="pt-BR"/>
           </a:p>
@@ -2083,7 +2083,7 @@
           <a:p>
             <a:fld id="{24DC6F6F-C09A-4FB7-97E3-78F353222510}" type="datetimeFigureOut">
               <a:rPr lang="pt-BR" smtClean="0"/>
-              <a:t>17/09/2018</a:t>
+              <a:t>18/09/2018</a:t>
             </a:fld>
             <a:endParaRPr lang="pt-BR"/>
           </a:p>
@@ -2335,7 +2335,7 @@
           <a:p>
             <a:fld id="{24DC6F6F-C09A-4FB7-97E3-78F353222510}" type="datetimeFigureOut">
               <a:rPr lang="pt-BR" smtClean="0"/>
-              <a:t>17/09/2018</a:t>
+              <a:t>18/09/2018</a:t>
             </a:fld>
             <a:endParaRPr lang="pt-BR"/>
           </a:p>
@@ -2546,7 +2546,7 @@
           <a:p>
             <a:fld id="{24DC6F6F-C09A-4FB7-97E3-78F353222510}" type="datetimeFigureOut">
               <a:rPr lang="pt-BR" smtClean="0"/>
-              <a:t>17/09/2018</a:t>
+              <a:t>18/09/2018</a:t>
             </a:fld>
             <a:endParaRPr lang="pt-BR"/>
           </a:p>
@@ -3351,6 +3351,13 @@
   <p:clrMapOvr>
     <a:masterClrMapping/>
   </p:clrMapOvr>
+  <p:timing>
+    <p:tnLst>
+      <p:par>
+        <p:cTn id="1" dur="indefinite" restart="never" nodeType="tmRoot"/>
+      </p:par>
+    </p:tnLst>
+  </p:timing>
 </p:sld>
 </file>
 
@@ -3853,36 +3860,6 @@
           </a:fontRef>
         </p:style>
       </p:cxnSp>
-      <p:pic>
-        <p:nvPicPr>
-          <p:cNvPr id="34" name="Imagem 33"/>
-          <p:cNvPicPr>
-            <a:picLocks noChangeAspect="1"/>
-          </p:cNvPicPr>
-          <p:nvPr/>
-        </p:nvPicPr>
-        <p:blipFill>
-          <a:blip r:embed="rId10">
-            <a:extLst>
-              <a:ext uri="{28A0092B-C50C-407E-A947-70E740481C1C}">
-                <a14:useLocalDpi xmlns:a14="http://schemas.microsoft.com/office/drawing/2010/main" val="0"/>
-              </a:ext>
-            </a:extLst>
-          </a:blip>
-          <a:stretch>
-            <a:fillRect/>
-          </a:stretch>
-        </p:blipFill>
-        <p:spPr>
-          <a:xfrm>
-            <a:off x="7987783" y="920262"/>
-            <a:ext cx="914479" cy="1518036"/>
-          </a:xfrm>
-          <a:prstGeom prst="rect">
-            <a:avLst/>
-          </a:prstGeom>
-        </p:spPr>
-      </p:pic>
       <p:sp>
         <p:nvSpPr>
           <p:cNvPr id="29" name="Retângulo 28"/>
@@ -3960,107 +3937,92 @@
           </a:p>
         </p:txBody>
       </p:sp>
-      <p:pic>
-        <p:nvPicPr>
-          <p:cNvPr id="57" name="Imagem 56"/>
-          <p:cNvPicPr>
-            <a:picLocks noChangeAspect="1"/>
-          </p:cNvPicPr>
+      <p:grpSp>
+        <p:nvGrpSpPr>
+          <p:cNvPr id="7" name="Agrupar 6"/>
+          <p:cNvGrpSpPr/>
           <p:nvPr/>
-        </p:nvPicPr>
-        <p:blipFill>
-          <a:blip r:embed="rId10">
-            <a:extLst>
-              <a:ext uri="{28A0092B-C50C-407E-A947-70E740481C1C}">
-                <a14:useLocalDpi xmlns:a14="http://schemas.microsoft.com/office/drawing/2010/main" val="0"/>
-              </a:ext>
-            </a:extLst>
-          </a:blip>
-          <a:stretch>
-            <a:fillRect/>
-          </a:stretch>
-        </p:blipFill>
-        <p:spPr>
-          <a:xfrm>
-            <a:off x="2319877" y="907462"/>
-            <a:ext cx="914479" cy="1518036"/>
-          </a:xfrm>
-          <a:prstGeom prst="rect">
-            <a:avLst/>
-          </a:prstGeom>
-        </p:spPr>
-      </p:pic>
-      <p:pic>
-        <p:nvPicPr>
-          <p:cNvPr id="56" name="Imagem 55"/>
-          <p:cNvPicPr>
-            <a:picLocks noChangeAspect="1"/>
-          </p:cNvPicPr>
-          <p:nvPr/>
-        </p:nvPicPr>
-        <p:blipFill>
-          <a:blip r:embed="rId10">
-            <a:extLst>
-              <a:ext uri="{28A0092B-C50C-407E-A947-70E740481C1C}">
-                <a14:useLocalDpi xmlns:a14="http://schemas.microsoft.com/office/drawing/2010/main" val="0"/>
-              </a:ext>
-            </a:extLst>
-          </a:blip>
-          <a:stretch>
-            <a:fillRect/>
-          </a:stretch>
-        </p:blipFill>
-        <p:spPr>
+        </p:nvGrpSpPr>
+        <p:grpSpPr>
           <a:xfrm>
             <a:off x="5485381" y="907462"/>
             <a:ext cx="914479" cy="1518036"/>
+            <a:chOff x="5485381" y="907462"/>
+            <a:chExt cx="914479" cy="1518036"/>
           </a:xfrm>
-          <a:prstGeom prst="rect">
-            <a:avLst/>
-          </a:prstGeom>
-        </p:spPr>
-      </p:pic>
-      <p:pic>
-        <p:nvPicPr>
-          <p:cNvPr id="2074" name="Picture 26" descr="Resultado de imagem para usb text icon"/>
-          <p:cNvPicPr>
-            <a:picLocks noChangeAspect="1" noChangeArrowheads="1"/>
-          </p:cNvPicPr>
-          <p:nvPr/>
-        </p:nvPicPr>
-        <p:blipFill>
-          <a:blip r:embed="rId11" cstate="print">
+        </p:grpSpPr>
+        <p:pic>
+          <p:nvPicPr>
+            <p:cNvPr id="56" name="Imagem 55"/>
+            <p:cNvPicPr>
+              <a:picLocks noChangeAspect="1"/>
+            </p:cNvPicPr>
+            <p:nvPr/>
+          </p:nvPicPr>
+          <p:blipFill>
+            <a:blip r:embed="rId10">
+              <a:extLst>
+                <a:ext uri="{28A0092B-C50C-407E-A947-70E740481C1C}">
+                  <a14:useLocalDpi xmlns:a14="http://schemas.microsoft.com/office/drawing/2010/main" val="0"/>
+                </a:ext>
+              </a:extLst>
+            </a:blip>
+            <a:stretch>
+              <a:fillRect/>
+            </a:stretch>
+          </p:blipFill>
+          <p:spPr>
+            <a:xfrm>
+              <a:off x="5485381" y="907462"/>
+              <a:ext cx="914479" cy="1518036"/>
+            </a:xfrm>
+            <a:prstGeom prst="rect">
+              <a:avLst/>
+            </a:prstGeom>
+          </p:spPr>
+        </p:pic>
+        <p:pic>
+          <p:nvPicPr>
+            <p:cNvPr id="2074" name="Picture 26" descr="Resultado de imagem para usb text icon"/>
+            <p:cNvPicPr>
+              <a:picLocks noChangeAspect="1" noChangeArrowheads="1"/>
+            </p:cNvPicPr>
+            <p:nvPr/>
+          </p:nvPicPr>
+          <p:blipFill>
+            <a:blip r:embed="rId11" cstate="print">
+              <a:extLst>
+                <a:ext uri="{28A0092B-C50C-407E-A947-70E740481C1C}">
+                  <a14:useLocalDpi xmlns:a14="http://schemas.microsoft.com/office/drawing/2010/main" val="0"/>
+                </a:ext>
+              </a:extLst>
+            </a:blip>
+            <a:srcRect/>
+            <a:stretch>
+              <a:fillRect/>
+            </a:stretch>
+          </p:blipFill>
+          <p:spPr bwMode="auto">
+            <a:xfrm>
+              <a:off x="5559283" y="994238"/>
+              <a:ext cx="735705" cy="735705"/>
+            </a:xfrm>
+            <a:prstGeom prst="rect">
+              <a:avLst/>
+            </a:prstGeom>
+            <a:noFill/>
             <a:extLst>
-              <a:ext uri="{28A0092B-C50C-407E-A947-70E740481C1C}">
-                <a14:useLocalDpi xmlns:a14="http://schemas.microsoft.com/office/drawing/2010/main" val="0"/>
+              <a:ext uri="{909E8E84-426E-40DD-AFC4-6F175D3DCCD1}">
+                <a14:hiddenFill xmlns:a14="http://schemas.microsoft.com/office/drawing/2010/main">
+                  <a:solidFill>
+                    <a:srgbClr val="FFFFFF"/>
+                  </a:solidFill>
+                </a14:hiddenFill>
               </a:ext>
             </a:extLst>
-          </a:blip>
-          <a:srcRect/>
-          <a:stretch>
-            <a:fillRect/>
-          </a:stretch>
-        </p:blipFill>
-        <p:spPr bwMode="auto">
-          <a:xfrm>
-            <a:off x="5559283" y="994238"/>
-            <a:ext cx="735705" cy="735705"/>
-          </a:xfrm>
-          <a:prstGeom prst="rect">
-            <a:avLst/>
-          </a:prstGeom>
-          <a:noFill/>
-          <a:extLst>
-            <a:ext uri="{909E8E84-426E-40DD-AFC4-6F175D3DCCD1}">
-              <a14:hiddenFill xmlns:a14="http://schemas.microsoft.com/office/drawing/2010/main">
-                <a:solidFill>
-                  <a:srgbClr val="FFFFFF"/>
-                </a:solidFill>
-              </a14:hiddenFill>
-            </a:ext>
-          </a:extLst>
-        </p:spPr>
-      </p:pic>
+          </p:spPr>
+        </p:pic>
+      </p:grpSp>
       <p:sp>
         <p:nvSpPr>
           <p:cNvPr id="37" name="Retângulo 36"/>
@@ -4166,88 +4128,178 @@
           </a:p>
         </p:txBody>
       </p:sp>
-      <p:pic>
-        <p:nvPicPr>
-          <p:cNvPr id="1032" name="Picture 8" descr="Resultado de imagem para temperature sensor icon"/>
-          <p:cNvPicPr>
-            <a:picLocks noChangeAspect="1" noChangeArrowheads="1"/>
-          </p:cNvPicPr>
+      <p:grpSp>
+        <p:nvGrpSpPr>
+          <p:cNvPr id="8" name="Agrupar 7"/>
+          <p:cNvGrpSpPr/>
           <p:nvPr/>
-        </p:nvPicPr>
-        <p:blipFill>
-          <a:blip r:embed="rId12" cstate="print">
+        </p:nvGrpSpPr>
+        <p:grpSpPr>
+          <a:xfrm>
+            <a:off x="2319877" y="907462"/>
+            <a:ext cx="914479" cy="1518036"/>
+            <a:chOff x="2319877" y="907462"/>
+            <a:chExt cx="914479" cy="1518036"/>
+          </a:xfrm>
+        </p:grpSpPr>
+        <p:pic>
+          <p:nvPicPr>
+            <p:cNvPr id="57" name="Imagem 56"/>
+            <p:cNvPicPr>
+              <a:picLocks noChangeAspect="1"/>
+            </p:cNvPicPr>
+            <p:nvPr/>
+          </p:nvPicPr>
+          <p:blipFill>
+            <a:blip r:embed="rId10">
+              <a:extLst>
+                <a:ext uri="{28A0092B-C50C-407E-A947-70E740481C1C}">
+                  <a14:useLocalDpi xmlns:a14="http://schemas.microsoft.com/office/drawing/2010/main" val="0"/>
+                </a:ext>
+              </a:extLst>
+            </a:blip>
+            <a:stretch>
+              <a:fillRect/>
+            </a:stretch>
+          </p:blipFill>
+          <p:spPr>
+            <a:xfrm>
+              <a:off x="2319877" y="907462"/>
+              <a:ext cx="914479" cy="1518036"/>
+            </a:xfrm>
+            <a:prstGeom prst="rect">
+              <a:avLst/>
+            </a:prstGeom>
+          </p:spPr>
+        </p:pic>
+        <p:pic>
+          <p:nvPicPr>
+            <p:cNvPr id="1032" name="Picture 8" descr="Resultado de imagem para temperature sensor icon"/>
+            <p:cNvPicPr>
+              <a:picLocks noChangeAspect="1" noChangeArrowheads="1"/>
+            </p:cNvPicPr>
+            <p:nvPr/>
+          </p:nvPicPr>
+          <p:blipFill>
+            <a:blip r:embed="rId12" cstate="print">
+              <a:extLst>
+                <a:ext uri="{28A0092B-C50C-407E-A947-70E740481C1C}">
+                  <a14:useLocalDpi xmlns:a14="http://schemas.microsoft.com/office/drawing/2010/main" val="0"/>
+                </a:ext>
+              </a:extLst>
+            </a:blip>
+            <a:srcRect/>
+            <a:stretch>
+              <a:fillRect/>
+            </a:stretch>
+          </p:blipFill>
+          <p:spPr bwMode="auto">
+            <a:xfrm>
+              <a:off x="2444568" y="1007050"/>
+              <a:ext cx="659642" cy="659642"/>
+            </a:xfrm>
+            <a:prstGeom prst="rect">
+              <a:avLst/>
+            </a:prstGeom>
+            <a:noFill/>
             <a:extLst>
-              <a:ext uri="{28A0092B-C50C-407E-A947-70E740481C1C}">
-                <a14:useLocalDpi xmlns:a14="http://schemas.microsoft.com/office/drawing/2010/main" val="0"/>
+              <a:ext uri="{909E8E84-426E-40DD-AFC4-6F175D3DCCD1}">
+                <a14:hiddenFill xmlns:a14="http://schemas.microsoft.com/office/drawing/2010/main">
+                  <a:solidFill>
+                    <a:srgbClr val="FFFFFF"/>
+                  </a:solidFill>
+                </a14:hiddenFill>
               </a:ext>
             </a:extLst>
-          </a:blip>
-          <a:srcRect/>
-          <a:stretch>
-            <a:fillRect/>
-          </a:stretch>
-        </p:blipFill>
-        <p:spPr bwMode="auto">
+          </p:spPr>
+        </p:pic>
+      </p:grpSp>
+      <p:grpSp>
+        <p:nvGrpSpPr>
+          <p:cNvPr id="6" name="Agrupar 5"/>
+          <p:cNvGrpSpPr/>
+          <p:nvPr/>
+        </p:nvGrpSpPr>
+        <p:grpSpPr>
           <a:xfrm>
-            <a:off x="2444568" y="1007050"/>
-            <a:ext cx="659642" cy="659642"/>
+            <a:off x="7987783" y="920262"/>
+            <a:ext cx="914479" cy="1518036"/>
+            <a:chOff x="7987783" y="920262"/>
+            <a:chExt cx="914479" cy="1518036"/>
           </a:xfrm>
-          <a:prstGeom prst="rect">
-            <a:avLst/>
-          </a:prstGeom>
-          <a:noFill/>
-          <a:extLst>
-            <a:ext uri="{909E8E84-426E-40DD-AFC4-6F175D3DCCD1}">
-              <a14:hiddenFill xmlns:a14="http://schemas.microsoft.com/office/drawing/2010/main">
-                <a:solidFill>
-                  <a:srgbClr val="FFFFFF"/>
-                </a:solidFill>
-              </a14:hiddenFill>
-            </a:ext>
-          </a:extLst>
-        </p:spPr>
-      </p:pic>
-      <p:pic>
-        <p:nvPicPr>
-          <p:cNvPr id="1034" name="Picture 10" descr="Resultado de imagem para internet icon"/>
-          <p:cNvPicPr>
-            <a:picLocks noChangeAspect="1" noChangeArrowheads="1"/>
-          </p:cNvPicPr>
-          <p:nvPr/>
-        </p:nvPicPr>
-        <p:blipFill>
-          <a:blip r:embed="rId13" cstate="print">
+        </p:grpSpPr>
+        <p:pic>
+          <p:nvPicPr>
+            <p:cNvPr id="34" name="Imagem 33"/>
+            <p:cNvPicPr>
+              <a:picLocks noChangeAspect="1"/>
+            </p:cNvPicPr>
+            <p:nvPr/>
+          </p:nvPicPr>
+          <p:blipFill>
+            <a:blip r:embed="rId10">
+              <a:extLst>
+                <a:ext uri="{28A0092B-C50C-407E-A947-70E740481C1C}">
+                  <a14:useLocalDpi xmlns:a14="http://schemas.microsoft.com/office/drawing/2010/main" val="0"/>
+                </a:ext>
+              </a:extLst>
+            </a:blip>
+            <a:stretch>
+              <a:fillRect/>
+            </a:stretch>
+          </p:blipFill>
+          <p:spPr>
+            <a:xfrm>
+              <a:off x="7987783" y="920262"/>
+              <a:ext cx="914479" cy="1518036"/>
+            </a:xfrm>
+            <a:prstGeom prst="rect">
+              <a:avLst/>
+            </a:prstGeom>
+          </p:spPr>
+        </p:pic>
+        <p:pic>
+          <p:nvPicPr>
+            <p:cNvPr id="1034" name="Picture 10" descr="Resultado de imagem para internet icon"/>
+            <p:cNvPicPr>
+              <a:picLocks noChangeAspect="1" noChangeArrowheads="1"/>
+            </p:cNvPicPr>
+            <p:nvPr/>
+          </p:nvPicPr>
+          <p:blipFill>
+            <a:blip r:embed="rId13" cstate="print">
+              <a:extLst>
+                <a:ext uri="{28A0092B-C50C-407E-A947-70E740481C1C}">
+                  <a14:useLocalDpi xmlns:a14="http://schemas.microsoft.com/office/drawing/2010/main" val="0"/>
+                </a:ext>
+              </a:extLst>
+            </a:blip>
+            <a:srcRect/>
+            <a:stretch>
+              <a:fillRect/>
+            </a:stretch>
+          </p:blipFill>
+          <p:spPr bwMode="auto">
+            <a:xfrm>
+              <a:off x="8171519" y="1081777"/>
+              <a:ext cx="560625" cy="560625"/>
+            </a:xfrm>
+            <a:prstGeom prst="rect">
+              <a:avLst/>
+            </a:prstGeom>
+            <a:noFill/>
             <a:extLst>
-              <a:ext uri="{28A0092B-C50C-407E-A947-70E740481C1C}">
-                <a14:useLocalDpi xmlns:a14="http://schemas.microsoft.com/office/drawing/2010/main" val="0"/>
+              <a:ext uri="{909E8E84-426E-40DD-AFC4-6F175D3DCCD1}">
+                <a14:hiddenFill xmlns:a14="http://schemas.microsoft.com/office/drawing/2010/main">
+                  <a:solidFill>
+                    <a:srgbClr val="FFFFFF"/>
+                  </a:solidFill>
+                </a14:hiddenFill>
               </a:ext>
             </a:extLst>
-          </a:blip>
-          <a:srcRect/>
-          <a:stretch>
-            <a:fillRect/>
-          </a:stretch>
-        </p:blipFill>
-        <p:spPr bwMode="auto">
-          <a:xfrm>
-            <a:off x="8171519" y="1081777"/>
-            <a:ext cx="560625" cy="560625"/>
-          </a:xfrm>
-          <a:prstGeom prst="rect">
-            <a:avLst/>
-          </a:prstGeom>
-          <a:noFill/>
-          <a:extLst>
-            <a:ext uri="{909E8E84-426E-40DD-AFC4-6F175D3DCCD1}">
-              <a14:hiddenFill xmlns:a14="http://schemas.microsoft.com/office/drawing/2010/main">
-                <a:solidFill>
-                  <a:srgbClr val="FFFFFF"/>
-                </a:solidFill>
-              </a14:hiddenFill>
-            </a:ext>
-          </a:extLst>
-        </p:spPr>
-      </p:pic>
+          </p:spPr>
+        </p:pic>
+      </p:grpSp>
       <p:sp>
         <p:nvSpPr>
           <p:cNvPr id="2" name="Retângulo 1"/>
@@ -4423,41 +4475,7 @@
                 </a:effectLst>
                 <a:latin typeface="Exo 2 Extra Light" panose="00000300000000000000" pitchFamily="50" charset="0"/>
               </a:rPr>
-              <a:t>Sensor de temperatura</a:t>
-            </a:r>
-            <a:r>
-              <a:rPr lang="pt-BR" sz="1600" dirty="0" smtClean="0">
-                <a:ln w="0"/>
-                <a:solidFill>
-                  <a:schemeClr val="bg1"/>
-                </a:solidFill>
-                <a:effectLst>
-                  <a:outerShdw blurRad="38100" dist="19050" dir="2700000" algn="tl" rotWithShape="0">
-                    <a:schemeClr val="dk1">
-                      <a:alpha val="40000"/>
-                    </a:schemeClr>
-                  </a:outerShdw>
-                </a:effectLst>
-                <a:latin typeface="Exo 2 Extra Light" panose="00000300000000000000" pitchFamily="50" charset="0"/>
-              </a:rPr>
-              <a:t> </a:t>
-            </a:r>
-            <a:r>
-              <a:rPr lang="pt-BR" sz="1600" dirty="0" smtClean="0">
-                <a:ln w="0"/>
-                <a:solidFill>
-                  <a:schemeClr val="bg1"/>
-                </a:solidFill>
-                <a:effectLst>
-                  <a:outerShdw blurRad="38100" dist="19050" dir="2700000" algn="tl" rotWithShape="0">
-                    <a:schemeClr val="dk1">
-                      <a:alpha val="40000"/>
-                    </a:schemeClr>
-                  </a:outerShdw>
-                </a:effectLst>
-                <a:latin typeface="Exo 2 Extra Light" panose="00000300000000000000" pitchFamily="50" charset="0"/>
-              </a:rPr>
-              <a:t>e umidade</a:t>
+              <a:t>Sensor de temperatura e umidade</a:t>
             </a:r>
             <a:endParaRPr lang="pt-BR" sz="1600" b="0" cap="none" spc="0" dirty="0">
               <a:ln w="0"/>
@@ -4833,7 +4851,7 @@
                                 </p:cTn>
                               </p:par>
                               <p:par>
-                                <p:cTn id="17" presetID="10" presetClass="entr" presetSubtype="0" fill="hold" nodeType="withEffect">
+                                <p:cTn id="17" presetID="10" presetClass="entr" presetSubtype="0" fill="hold" grpId="0" nodeType="withEffect">
                                   <p:stCondLst>
                                     <p:cond delay="0"/>
                                   </p:stCondLst>
@@ -4846,7 +4864,7 @@
                                           </p:stCondLst>
                                         </p:cTn>
                                         <p:tgtEl>
-                                          <p:spTgt spid="16"/>
+                                          <p:spTgt spid="4"/>
                                         </p:tgtEl>
                                         <p:attrNameLst>
                                           <p:attrName>style.visibility</p:attrName>
@@ -4860,7 +4878,7 @@
                                       <p:cBhvr>
                                         <p:cTn id="19" dur="750"/>
                                         <p:tgtEl>
-                                          <p:spTgt spid="16"/>
+                                          <p:spTgt spid="4"/>
                                         </p:tgtEl>
                                       </p:cBhvr>
                                     </p:animEffect>
@@ -4881,7 +4899,7 @@
                                           </p:stCondLst>
                                         </p:cTn>
                                         <p:tgtEl>
-                                          <p:spTgt spid="18"/>
+                                          <p:spTgt spid="16"/>
                                         </p:tgtEl>
                                         <p:attrNameLst>
                                           <p:attrName>style.visibility</p:attrName>
@@ -4895,7 +4913,7 @@
                                       <p:cBhvr>
                                         <p:cTn id="22" dur="750"/>
                                         <p:tgtEl>
-                                          <p:spTgt spid="18"/>
+                                          <p:spTgt spid="16"/>
                                         </p:tgtEl>
                                       </p:cBhvr>
                                     </p:animEffect>
@@ -4916,7 +4934,7 @@
                                           </p:stCondLst>
                                         </p:cTn>
                                         <p:tgtEl>
-                                          <p:spTgt spid="2066"/>
+                                          <p:spTgt spid="18"/>
                                         </p:tgtEl>
                                         <p:attrNameLst>
                                           <p:attrName>style.visibility</p:attrName>
@@ -4930,7 +4948,7 @@
                                       <p:cBhvr>
                                         <p:cTn id="25" dur="750"/>
                                         <p:tgtEl>
-                                          <p:spTgt spid="2066"/>
+                                          <p:spTgt spid="18"/>
                                         </p:tgtEl>
                                       </p:cBhvr>
                                     </p:animEffect>
@@ -4951,7 +4969,7 @@
                                           </p:stCondLst>
                                         </p:cTn>
                                         <p:tgtEl>
-                                          <p:spTgt spid="23"/>
+                                          <p:spTgt spid="2066"/>
                                         </p:tgtEl>
                                         <p:attrNameLst>
                                           <p:attrName>style.visibility</p:attrName>
@@ -4965,7 +4983,7 @@
                                       <p:cBhvr>
                                         <p:cTn id="28" dur="750"/>
                                         <p:tgtEl>
-                                          <p:spTgt spid="23"/>
+                                          <p:spTgt spid="2066"/>
                                         </p:tgtEl>
                                       </p:cBhvr>
                                     </p:animEffect>
@@ -4973,7 +4991,7 @@
                                 </p:cTn>
                               </p:par>
                               <p:par>
-                                <p:cTn id="29" presetID="10" presetClass="entr" presetSubtype="0" fill="hold" grpId="0" nodeType="withEffect">
+                                <p:cTn id="29" presetID="10" presetClass="entr" presetSubtype="0" fill="hold" nodeType="withEffect">
                                   <p:stCondLst>
                                     <p:cond delay="0"/>
                                   </p:stCondLst>
@@ -4986,7 +5004,7 @@
                                           </p:stCondLst>
                                         </p:cTn>
                                         <p:tgtEl>
-                                          <p:spTgt spid="29"/>
+                                          <p:spTgt spid="23"/>
                                         </p:tgtEl>
                                         <p:attrNameLst>
                                           <p:attrName>style.visibility</p:attrName>
@@ -5000,7 +5018,7 @@
                                       <p:cBhvr>
                                         <p:cTn id="31" dur="750"/>
                                         <p:tgtEl>
-                                          <p:spTgt spid="29"/>
+                                          <p:spTgt spid="23"/>
                                         </p:tgtEl>
                                       </p:cBhvr>
                                     </p:animEffect>
@@ -5008,7 +5026,7 @@
                                 </p:cTn>
                               </p:par>
                               <p:par>
-                                <p:cTn id="32" presetID="10" presetClass="entr" presetSubtype="0" fill="hold" nodeType="withEffect">
+                                <p:cTn id="32" presetID="10" presetClass="entr" presetSubtype="0" fill="hold" grpId="0" nodeType="withEffect">
                                   <p:stCondLst>
                                     <p:cond delay="0"/>
                                   </p:stCondLst>
@@ -5021,7 +5039,7 @@
                                           </p:stCondLst>
                                         </p:cTn>
                                         <p:tgtEl>
-                                          <p:spTgt spid="2054"/>
+                                          <p:spTgt spid="29"/>
                                         </p:tgtEl>
                                         <p:attrNameLst>
                                           <p:attrName>style.visibility</p:attrName>
@@ -5035,7 +5053,7 @@
                                       <p:cBhvr>
                                         <p:cTn id="34" dur="750"/>
                                         <p:tgtEl>
-                                          <p:spTgt spid="2054"/>
+                                          <p:spTgt spid="29"/>
                                         </p:tgtEl>
                                       </p:cBhvr>
                                     </p:animEffect>
@@ -5043,7 +5061,7 @@
                                 </p:cTn>
                               </p:par>
                               <p:par>
-                                <p:cTn id="35" presetID="42" presetClass="entr" presetSubtype="0" fill="hold" nodeType="withEffect">
+                                <p:cTn id="35" presetID="10" presetClass="entr" presetSubtype="0" fill="hold" grpId="0" nodeType="withEffect">
                                   <p:stCondLst>
                                     <p:cond delay="0"/>
                                   </p:stCondLst>
@@ -5056,7 +5074,7 @@
                                           </p:stCondLst>
                                         </p:cTn>
                                         <p:tgtEl>
-                                          <p:spTgt spid="2074"/>
+                                          <p:spTgt spid="2"/>
                                         </p:tgtEl>
                                         <p:attrNameLst>
                                           <p:attrName>style.visibility</p:attrName>
@@ -5068,17 +5086,236 @@
                                     </p:set>
                                     <p:animEffect transition="in" filter="fade">
                                       <p:cBhvr>
-                                        <p:cTn id="37" dur="500"/>
-                                        <p:tgtEl>
-                                          <p:spTgt spid="2074"/>
+                                        <p:cTn id="37" dur="750"/>
+                                        <p:tgtEl>
+                                          <p:spTgt spid="2"/>
+                                        </p:tgtEl>
+                                      </p:cBhvr>
+                                    </p:animEffect>
+                                  </p:childTnLst>
+                                </p:cTn>
+                              </p:par>
+                              <p:par>
+                                <p:cTn id="38" presetID="10" presetClass="entr" presetSubtype="0" fill="hold" grpId="0" nodeType="withEffect">
+                                  <p:stCondLst>
+                                    <p:cond delay="0"/>
+                                  </p:stCondLst>
+                                  <p:childTnLst>
+                                    <p:set>
+                                      <p:cBhvr>
+                                        <p:cTn id="39" dur="1" fill="hold">
+                                          <p:stCondLst>
+                                            <p:cond delay="0"/>
+                                          </p:stCondLst>
+                                        </p:cTn>
+                                        <p:tgtEl>
+                                          <p:spTgt spid="39"/>
+                                        </p:tgtEl>
+                                        <p:attrNameLst>
+                                          <p:attrName>style.visibility</p:attrName>
+                                        </p:attrNameLst>
+                                      </p:cBhvr>
+                                      <p:to>
+                                        <p:strVal val="visible"/>
+                                      </p:to>
+                                    </p:set>
+                                    <p:animEffect transition="in" filter="fade">
+                                      <p:cBhvr>
+                                        <p:cTn id="40" dur="750"/>
+                                        <p:tgtEl>
+                                          <p:spTgt spid="39"/>
+                                        </p:tgtEl>
+                                      </p:cBhvr>
+                                    </p:animEffect>
+                                  </p:childTnLst>
+                                </p:cTn>
+                              </p:par>
+                              <p:par>
+                                <p:cTn id="41" presetID="10" presetClass="entr" presetSubtype="0" fill="hold" grpId="0" nodeType="withEffect">
+                                  <p:stCondLst>
+                                    <p:cond delay="0"/>
+                                  </p:stCondLst>
+                                  <p:childTnLst>
+                                    <p:set>
+                                      <p:cBhvr>
+                                        <p:cTn id="42" dur="1" fill="hold">
+                                          <p:stCondLst>
+                                            <p:cond delay="0"/>
+                                          </p:stCondLst>
+                                        </p:cTn>
+                                        <p:tgtEl>
+                                          <p:spTgt spid="41"/>
+                                        </p:tgtEl>
+                                        <p:attrNameLst>
+                                          <p:attrName>style.visibility</p:attrName>
+                                        </p:attrNameLst>
+                                      </p:cBhvr>
+                                      <p:to>
+                                        <p:strVal val="visible"/>
+                                      </p:to>
+                                    </p:set>
+                                    <p:animEffect transition="in" filter="fade">
+                                      <p:cBhvr>
+                                        <p:cTn id="43" dur="750"/>
+                                        <p:tgtEl>
+                                          <p:spTgt spid="41"/>
+                                        </p:tgtEl>
+                                      </p:cBhvr>
+                                    </p:animEffect>
+                                  </p:childTnLst>
+                                </p:cTn>
+                              </p:par>
+                              <p:par>
+                                <p:cTn id="44" presetID="10" presetClass="entr" presetSubtype="0" fill="hold" grpId="0" nodeType="withEffect">
+                                  <p:stCondLst>
+                                    <p:cond delay="0"/>
+                                  </p:stCondLst>
+                                  <p:childTnLst>
+                                    <p:set>
+                                      <p:cBhvr>
+                                        <p:cTn id="45" dur="1" fill="hold">
+                                          <p:stCondLst>
+                                            <p:cond delay="0"/>
+                                          </p:stCondLst>
+                                        </p:cTn>
+                                        <p:tgtEl>
+                                          <p:spTgt spid="42"/>
+                                        </p:tgtEl>
+                                        <p:attrNameLst>
+                                          <p:attrName>style.visibility</p:attrName>
+                                        </p:attrNameLst>
+                                      </p:cBhvr>
+                                      <p:to>
+                                        <p:strVal val="visible"/>
+                                      </p:to>
+                                    </p:set>
+                                    <p:animEffect transition="in" filter="fade">
+                                      <p:cBhvr>
+                                        <p:cTn id="46" dur="750"/>
+                                        <p:tgtEl>
+                                          <p:spTgt spid="42"/>
+                                        </p:tgtEl>
+                                      </p:cBhvr>
+                                    </p:animEffect>
+                                  </p:childTnLst>
+                                </p:cTn>
+                              </p:par>
+                              <p:par>
+                                <p:cTn id="47" presetID="10" presetClass="entr" presetSubtype="0" fill="hold" grpId="0" nodeType="withEffect">
+                                  <p:stCondLst>
+                                    <p:cond delay="0"/>
+                                  </p:stCondLst>
+                                  <p:childTnLst>
+                                    <p:set>
+                                      <p:cBhvr>
+                                        <p:cTn id="48" dur="1" fill="hold">
+                                          <p:stCondLst>
+                                            <p:cond delay="0"/>
+                                          </p:stCondLst>
+                                        </p:cTn>
+                                        <p:tgtEl>
+                                          <p:spTgt spid="47"/>
+                                        </p:tgtEl>
+                                        <p:attrNameLst>
+                                          <p:attrName>style.visibility</p:attrName>
+                                        </p:attrNameLst>
+                                      </p:cBhvr>
+                                      <p:to>
+                                        <p:strVal val="visible"/>
+                                      </p:to>
+                                    </p:set>
+                                    <p:animEffect transition="in" filter="fade">
+                                      <p:cBhvr>
+                                        <p:cTn id="49" dur="750"/>
+                                        <p:tgtEl>
+                                          <p:spTgt spid="47"/>
+                                        </p:tgtEl>
+                                      </p:cBhvr>
+                                    </p:animEffect>
+                                  </p:childTnLst>
+                                </p:cTn>
+                              </p:par>
+                              <p:par>
+                                <p:cTn id="50" presetID="10" presetClass="entr" presetSubtype="0" fill="hold" nodeType="withEffect">
+                                  <p:stCondLst>
+                                    <p:cond delay="0"/>
+                                  </p:stCondLst>
+                                  <p:childTnLst>
+                                    <p:set>
+                                      <p:cBhvr>
+                                        <p:cTn id="51" dur="1" fill="hold">
+                                          <p:stCondLst>
+                                            <p:cond delay="0"/>
+                                          </p:stCondLst>
+                                        </p:cTn>
+                                        <p:tgtEl>
+                                          <p:spTgt spid="2054"/>
+                                        </p:tgtEl>
+                                        <p:attrNameLst>
+                                          <p:attrName>style.visibility</p:attrName>
+                                        </p:attrNameLst>
+                                      </p:cBhvr>
+                                      <p:to>
+                                        <p:strVal val="visible"/>
+                                      </p:to>
+                                    </p:set>
+                                    <p:animEffect transition="in" filter="fade">
+                                      <p:cBhvr>
+                                        <p:cTn id="52" dur="750"/>
+                                        <p:tgtEl>
+                                          <p:spTgt spid="2054"/>
+                                        </p:tgtEl>
+                                      </p:cBhvr>
+                                    </p:animEffect>
+                                  </p:childTnLst>
+                                </p:cTn>
+                              </p:par>
+                            </p:childTnLst>
+                          </p:cTn>
+                        </p:par>
+                        <p:par>
+                          <p:cTn id="53" fill="hold">
+                            <p:stCondLst>
+                              <p:cond delay="750"/>
+                            </p:stCondLst>
+                            <p:childTnLst>
+                              <p:par>
+                                <p:cTn id="54" presetID="42" presetClass="entr" presetSubtype="0" fill="hold" nodeType="afterEffect">
+                                  <p:stCondLst>
+                                    <p:cond delay="0"/>
+                                  </p:stCondLst>
+                                  <p:childTnLst>
+                                    <p:set>
+                                      <p:cBhvr>
+                                        <p:cTn id="55" dur="1" fill="hold">
+                                          <p:stCondLst>
+                                            <p:cond delay="0"/>
+                                          </p:stCondLst>
+                                        </p:cTn>
+                                        <p:tgtEl>
+                                          <p:spTgt spid="8"/>
+                                        </p:tgtEl>
+                                        <p:attrNameLst>
+                                          <p:attrName>style.visibility</p:attrName>
+                                        </p:attrNameLst>
+                                      </p:cBhvr>
+                                      <p:to>
+                                        <p:strVal val="visible"/>
+                                      </p:to>
+                                    </p:set>
+                                    <p:animEffect transition="in" filter="fade">
+                                      <p:cBhvr>
+                                        <p:cTn id="56" dur="500"/>
+                                        <p:tgtEl>
+                                          <p:spTgt spid="8"/>
                                         </p:tgtEl>
                                       </p:cBhvr>
                                     </p:animEffect>
                                     <p:anim calcmode="lin" valueType="num">
                                       <p:cBhvr>
-                                        <p:cTn id="38" dur="500" fill="hold"/>
-                                        <p:tgtEl>
-                                          <p:spTgt spid="2074"/>
+                                        <p:cTn id="57" dur="500" fill="hold"/>
+                                        <p:tgtEl>
+                                          <p:spTgt spid="8"/>
                                         </p:tgtEl>
                                         <p:attrNameLst>
                                           <p:attrName>ppt_x</p:attrName>
@@ -5099,9 +5336,9 @@
                                     </p:anim>
                                     <p:anim calcmode="lin" valueType="num">
                                       <p:cBhvr>
-                                        <p:cTn id="39" dur="500" fill="hold"/>
-                                        <p:tgtEl>
-                                          <p:spTgt spid="2074"/>
+                                        <p:cTn id="58" dur="500" fill="hold"/>
+                                        <p:tgtEl>
+                                          <p:spTgt spid="8"/>
                                         </p:tgtEl>
                                         <p:attrNameLst>
                                           <p:attrName>ppt_y</p:attrName>
@@ -5124,20 +5361,20 @@
                                 </p:cTn>
                               </p:par>
                               <p:par>
-                                <p:cTn id="40" presetID="42" presetClass="entr" presetSubtype="0" fill="hold" nodeType="withEffect">
+                                <p:cTn id="59" presetID="42" presetClass="entr" presetSubtype="0" fill="hold" nodeType="withEffect">
                                   <p:stCondLst>
                                     <p:cond delay="0"/>
                                   </p:stCondLst>
                                   <p:childTnLst>
                                     <p:set>
                                       <p:cBhvr>
-                                        <p:cTn id="41" dur="1" fill="hold">
+                                        <p:cTn id="60" dur="1" fill="hold">
                                           <p:stCondLst>
                                             <p:cond delay="0"/>
                                           </p:stCondLst>
                                         </p:cTn>
                                         <p:tgtEl>
-                                          <p:spTgt spid="34"/>
+                                          <p:spTgt spid="3"/>
                                         </p:tgtEl>
                                         <p:attrNameLst>
                                           <p:attrName>style.visibility</p:attrName>
@@ -5149,17 +5386,17 @@
                                     </p:set>
                                     <p:animEffect transition="in" filter="fade">
                                       <p:cBhvr>
-                                        <p:cTn id="42" dur="500"/>
-                                        <p:tgtEl>
-                                          <p:spTgt spid="34"/>
+                                        <p:cTn id="61" dur="500"/>
+                                        <p:tgtEl>
+                                          <p:spTgt spid="3"/>
                                         </p:tgtEl>
                                       </p:cBhvr>
                                     </p:animEffect>
                                     <p:anim calcmode="lin" valueType="num">
                                       <p:cBhvr>
-                                        <p:cTn id="43" dur="500" fill="hold"/>
-                                        <p:tgtEl>
-                                          <p:spTgt spid="34"/>
+                                        <p:cTn id="62" dur="500" fill="hold"/>
+                                        <p:tgtEl>
+                                          <p:spTgt spid="3"/>
                                         </p:tgtEl>
                                         <p:attrNameLst>
                                           <p:attrName>ppt_x</p:attrName>
@@ -5180,9 +5417,9 @@
                                     </p:anim>
                                     <p:anim calcmode="lin" valueType="num">
                                       <p:cBhvr>
-                                        <p:cTn id="44" dur="500" fill="hold"/>
-                                        <p:tgtEl>
-                                          <p:spTgt spid="34"/>
+                                        <p:cTn id="63" dur="500" fill="hold"/>
+                                        <p:tgtEl>
+                                          <p:spTgt spid="3"/>
                                         </p:tgtEl>
                                         <p:attrNameLst>
                                           <p:attrName>ppt_y</p:attrName>
@@ -5205,20 +5442,20 @@
                                 </p:cTn>
                               </p:par>
                               <p:par>
-                                <p:cTn id="45" presetID="42" presetClass="entr" presetSubtype="0" fill="hold" nodeType="withEffect">
+                                <p:cTn id="64" presetID="42" presetClass="entr" presetSubtype="0" fill="hold" nodeType="withEffect">
                                   <p:stCondLst>
                                     <p:cond delay="0"/>
                                   </p:stCondLst>
                                   <p:childTnLst>
                                     <p:set>
                                       <p:cBhvr>
-                                        <p:cTn id="46" dur="1" fill="hold">
+                                        <p:cTn id="65" dur="1" fill="hold">
                                           <p:stCondLst>
                                             <p:cond delay="0"/>
                                           </p:stCondLst>
                                         </p:cTn>
                                         <p:tgtEl>
-                                          <p:spTgt spid="57"/>
+                                          <p:spTgt spid="7"/>
                                         </p:tgtEl>
                                         <p:attrNameLst>
                                           <p:attrName>style.visibility</p:attrName>
@@ -5230,17 +5467,17 @@
                                     </p:set>
                                     <p:animEffect transition="in" filter="fade">
                                       <p:cBhvr>
-                                        <p:cTn id="47" dur="500"/>
-                                        <p:tgtEl>
-                                          <p:spTgt spid="57"/>
+                                        <p:cTn id="66" dur="500"/>
+                                        <p:tgtEl>
+                                          <p:spTgt spid="7"/>
                                         </p:tgtEl>
                                       </p:cBhvr>
                                     </p:animEffect>
                                     <p:anim calcmode="lin" valueType="num">
                                       <p:cBhvr>
-                                        <p:cTn id="48" dur="500" fill="hold"/>
-                                        <p:tgtEl>
-                                          <p:spTgt spid="57"/>
+                                        <p:cTn id="67" dur="500" fill="hold"/>
+                                        <p:tgtEl>
+                                          <p:spTgt spid="7"/>
                                         </p:tgtEl>
                                         <p:attrNameLst>
                                           <p:attrName>ppt_x</p:attrName>
@@ -5261,9 +5498,9 @@
                                     </p:anim>
                                     <p:anim calcmode="lin" valueType="num">
                                       <p:cBhvr>
-                                        <p:cTn id="49" dur="500" fill="hold"/>
-                                        <p:tgtEl>
-                                          <p:spTgt spid="57"/>
+                                        <p:cTn id="68" dur="500" fill="hold"/>
+                                        <p:tgtEl>
+                                          <p:spTgt spid="7"/>
                                         </p:tgtEl>
                                         <p:attrNameLst>
                                           <p:attrName>ppt_y</p:attrName>
@@ -5286,20 +5523,20 @@
                                 </p:cTn>
                               </p:par>
                               <p:par>
-                                <p:cTn id="50" presetID="42" presetClass="entr" presetSubtype="0" fill="hold" nodeType="withEffect">
+                                <p:cTn id="69" presetID="42" presetClass="entr" presetSubtype="0" fill="hold" nodeType="withEffect">
                                   <p:stCondLst>
                                     <p:cond delay="0"/>
                                   </p:stCondLst>
                                   <p:childTnLst>
                                     <p:set>
                                       <p:cBhvr>
-                                        <p:cTn id="51" dur="1" fill="hold">
+                                        <p:cTn id="70" dur="1" fill="hold">
                                           <p:stCondLst>
                                             <p:cond delay="0"/>
                                           </p:stCondLst>
                                         </p:cTn>
                                         <p:tgtEl>
-                                          <p:spTgt spid="56"/>
+                                          <p:spTgt spid="6"/>
                                         </p:tgtEl>
                                         <p:attrNameLst>
                                           <p:attrName>style.visibility</p:attrName>
@@ -5311,17 +5548,17 @@
                                     </p:set>
                                     <p:animEffect transition="in" filter="fade">
                                       <p:cBhvr>
-                                        <p:cTn id="52" dur="500"/>
-                                        <p:tgtEl>
-                                          <p:spTgt spid="56"/>
+                                        <p:cTn id="71" dur="500"/>
+                                        <p:tgtEl>
+                                          <p:spTgt spid="6"/>
                                         </p:tgtEl>
                                       </p:cBhvr>
                                     </p:animEffect>
                                     <p:anim calcmode="lin" valueType="num">
                                       <p:cBhvr>
-                                        <p:cTn id="53" dur="500" fill="hold"/>
-                                        <p:tgtEl>
-                                          <p:spTgt spid="56"/>
+                                        <p:cTn id="72" dur="500" fill="hold"/>
+                                        <p:tgtEl>
+                                          <p:spTgt spid="6"/>
                                         </p:tgtEl>
                                         <p:attrNameLst>
                                           <p:attrName>ppt_x</p:attrName>
@@ -5342,9 +5579,9 @@
                                     </p:anim>
                                     <p:anim calcmode="lin" valueType="num">
                                       <p:cBhvr>
-                                        <p:cTn id="54" dur="500" fill="hold"/>
-                                        <p:tgtEl>
-                                          <p:spTgt spid="56"/>
+                                        <p:cTn id="73" dur="500" fill="hold"/>
+                                        <p:tgtEl>
+                                          <p:spTgt spid="6"/>
                                         </p:tgtEl>
                                         <p:attrNameLst>
                                           <p:attrName>ppt_y</p:attrName>
@@ -5394,7 +5631,13 @@
       </p:par>
     </p:tnLst>
     <p:bldLst>
+      <p:bldP spid="4" grpId="0" animBg="1"/>
       <p:bldP spid="29" grpId="0"/>
+      <p:bldP spid="2" grpId="0"/>
+      <p:bldP spid="39" grpId="0"/>
+      <p:bldP spid="41" grpId="0"/>
+      <p:bldP spid="42" grpId="0"/>
+      <p:bldP spid="47" grpId="0"/>
     </p:bldLst>
   </p:timing>
 </p:sld>
@@ -5463,6 +5706,54 @@
       </p:pic>
       <p:sp>
         <p:nvSpPr>
+          <p:cNvPr id="63" name="Retângulo 62"/>
+          <p:cNvSpPr/>
+          <p:nvPr/>
+        </p:nvSpPr>
+        <p:spPr>
+          <a:xfrm>
+            <a:off x="5898739" y="1553269"/>
+            <a:ext cx="4410308" cy="3369570"/>
+          </a:xfrm>
+          <a:prstGeom prst="rect">
+            <a:avLst/>
+          </a:prstGeom>
+          <a:solidFill>
+            <a:schemeClr val="bg1">
+              <a:alpha val="36000"/>
+            </a:schemeClr>
+          </a:solidFill>
+          <a:ln>
+            <a:noFill/>
+          </a:ln>
+        </p:spPr>
+        <p:style>
+          <a:lnRef idx="2">
+            <a:schemeClr val="accent1">
+              <a:shade val="50000"/>
+            </a:schemeClr>
+          </a:lnRef>
+          <a:fillRef idx="1">
+            <a:schemeClr val="accent1"/>
+          </a:fillRef>
+          <a:effectRef idx="0">
+            <a:schemeClr val="accent1"/>
+          </a:effectRef>
+          <a:fontRef idx="minor">
+            <a:schemeClr val="lt1"/>
+          </a:fontRef>
+        </p:style>
+        <p:txBody>
+          <a:bodyPr rtlCol="0" anchor="ctr"/>
+          <a:lstStyle/>
+          <a:p>
+            <a:pPr algn="ctr"/>
+            <a:endParaRPr lang="pt-BR" dirty="0"/>
+          </a:p>
+        </p:txBody>
+      </p:sp>
+      <p:sp>
+        <p:nvSpPr>
           <p:cNvPr id="5" name="Retângulo 4"/>
           <p:cNvSpPr/>
           <p:nvPr/>
@@ -5563,54 +5854,6 @@
               </a:effectLst>
               <a:latin typeface="Exo 2 Extra Light" panose="00000300000000000000" pitchFamily="50" charset="0"/>
             </a:endParaRPr>
-          </a:p>
-        </p:txBody>
-      </p:sp>
-      <p:sp>
-        <p:nvSpPr>
-          <p:cNvPr id="63" name="Retângulo 62"/>
-          <p:cNvSpPr/>
-          <p:nvPr/>
-        </p:nvSpPr>
-        <p:spPr>
-          <a:xfrm>
-            <a:off x="5898739" y="1553269"/>
-            <a:ext cx="4410308" cy="3369570"/>
-          </a:xfrm>
-          <a:prstGeom prst="rect">
-            <a:avLst/>
-          </a:prstGeom>
-          <a:solidFill>
-            <a:schemeClr val="bg1">
-              <a:alpha val="36000"/>
-            </a:schemeClr>
-          </a:solidFill>
-          <a:ln>
-            <a:noFill/>
-          </a:ln>
-        </p:spPr>
-        <p:style>
-          <a:lnRef idx="2">
-            <a:schemeClr val="accent1">
-              <a:shade val="50000"/>
-            </a:schemeClr>
-          </a:lnRef>
-          <a:fillRef idx="1">
-            <a:schemeClr val="accent1"/>
-          </a:fillRef>
-          <a:effectRef idx="0">
-            <a:schemeClr val="accent1"/>
-          </a:effectRef>
-          <a:fontRef idx="minor">
-            <a:schemeClr val="lt1"/>
-          </a:fontRef>
-        </p:style>
-        <p:txBody>
-          <a:bodyPr rtlCol="0" anchor="ctr"/>
-          <a:lstStyle/>
-          <a:p>
-            <a:pPr algn="ctr"/>
-            <a:endParaRPr lang="pt-BR" dirty="0"/>
           </a:p>
         </p:txBody>
       </p:sp>
@@ -5805,7 +6048,7 @@
         </p:nvGrpSpPr>
         <p:grpSpPr>
           <a:xfrm>
-            <a:off x="2488211" y="5367495"/>
+            <a:off x="2488211" y="5338467"/>
             <a:ext cx="1187974" cy="809251"/>
             <a:chOff x="1637046" y="2388685"/>
             <a:chExt cx="1187974" cy="809251"/>
@@ -6101,7 +6344,7 @@
         </p:nvCxnSpPr>
         <p:spPr>
           <a:xfrm>
-            <a:off x="7111999" y="3951347"/>
+            <a:off x="7082971" y="3243489"/>
             <a:ext cx="1433258" cy="0"/>
           </a:xfrm>
           <a:prstGeom prst="line">
@@ -6195,7 +6438,7 @@
         </p:nvCxnSpPr>
         <p:spPr>
           <a:xfrm flipV="1">
-            <a:off x="6734535" y="4740019"/>
+            <a:off x="6705507" y="3607862"/>
             <a:ext cx="0" cy="686970"/>
           </a:xfrm>
           <a:prstGeom prst="line">
@@ -6270,6 +6513,42 @@
           </a:p>
         </p:txBody>
       </p:sp>
+      <p:cxnSp>
+        <p:nvCxnSpPr>
+          <p:cNvPr id="60" name="Conector reto 59"/>
+          <p:cNvCxnSpPr/>
+          <p:nvPr/>
+        </p:nvCxnSpPr>
+        <p:spPr>
+          <a:xfrm flipV="1">
+            <a:off x="6704215" y="2514510"/>
+            <a:ext cx="0" cy="686970"/>
+          </a:xfrm>
+          <a:prstGeom prst="line">
+            <a:avLst/>
+          </a:prstGeom>
+          <a:ln w="57150">
+            <a:solidFill>
+              <a:schemeClr val="bg1"/>
+            </a:solidFill>
+            <a:prstDash val="solid"/>
+          </a:ln>
+        </p:spPr>
+        <p:style>
+          <a:lnRef idx="1">
+            <a:schemeClr val="accent1"/>
+          </a:lnRef>
+          <a:fillRef idx="0">
+            <a:schemeClr val="accent1"/>
+          </a:fillRef>
+          <a:effectRef idx="0">
+            <a:schemeClr val="accent1"/>
+          </a:effectRef>
+          <a:fontRef idx="minor">
+            <a:schemeClr val="tx1"/>
+          </a:fontRef>
+        </p:style>
+      </p:cxnSp>
       <p:cxnSp>
         <p:nvCxnSpPr>
           <p:cNvPr id="35" name="Conector reto 34"/>
@@ -6363,122 +6642,6 @@
           </a:p>
         </p:txBody>
       </p:sp>
-      <p:grpSp>
-        <p:nvGrpSpPr>
-          <p:cNvPr id="79" name="Agrupar 78"/>
-          <p:cNvGrpSpPr/>
-          <p:nvPr/>
-        </p:nvGrpSpPr>
-        <p:grpSpPr>
-          <a:xfrm>
-            <a:off x="6196115" y="5246662"/>
-            <a:ext cx="1074256" cy="1188269"/>
-            <a:chOff x="6550766" y="5096375"/>
-            <a:chExt cx="1074256" cy="1188269"/>
-          </a:xfrm>
-        </p:grpSpPr>
-        <p:sp>
-          <p:nvSpPr>
-            <p:cNvPr id="43" name="Fluxograma: Disco Magnético 42"/>
-            <p:cNvSpPr/>
-            <p:nvPr/>
-          </p:nvSpPr>
-          <p:spPr>
-            <a:xfrm>
-              <a:off x="6550766" y="5096375"/>
-              <a:ext cx="1074256" cy="1188269"/>
-            </a:xfrm>
-            <a:prstGeom prst="flowChartMagneticDisk">
-              <a:avLst/>
-            </a:prstGeom>
-            <a:solidFill>
-              <a:schemeClr val="bg1"/>
-            </a:solidFill>
-            <a:ln>
-              <a:solidFill>
-                <a:schemeClr val="bg2">
-                  <a:lumMod val="50000"/>
-                </a:schemeClr>
-              </a:solidFill>
-            </a:ln>
-          </p:spPr>
-          <p:style>
-            <a:lnRef idx="2">
-              <a:schemeClr val="accent1">
-                <a:shade val="50000"/>
-              </a:schemeClr>
-            </a:lnRef>
-            <a:fillRef idx="1">
-              <a:schemeClr val="accent1"/>
-            </a:fillRef>
-            <a:effectRef idx="0">
-              <a:schemeClr val="accent1"/>
-            </a:effectRef>
-            <a:fontRef idx="minor">
-              <a:schemeClr val="lt1"/>
-            </a:fontRef>
-          </p:style>
-          <p:txBody>
-            <a:bodyPr rtlCol="0" anchor="ctr"/>
-            <a:lstStyle/>
-            <a:p>
-              <a:pPr algn="ctr"/>
-              <a:endParaRPr lang="pt-BR"/>
-            </a:p>
-          </p:txBody>
-        </p:sp>
-        <p:sp>
-          <p:nvSpPr>
-            <p:cNvPr id="40" name="Retângulo 39"/>
-            <p:cNvSpPr/>
-            <p:nvPr/>
-          </p:nvSpPr>
-          <p:spPr>
-            <a:xfrm>
-              <a:off x="6646532" y="5540423"/>
-              <a:ext cx="882726" cy="646331"/>
-            </a:xfrm>
-            <a:prstGeom prst="rect">
-              <a:avLst/>
-            </a:prstGeom>
-            <a:noFill/>
-          </p:spPr>
-          <p:txBody>
-            <a:bodyPr wrap="square" lIns="91440" tIns="45720" rIns="91440" bIns="45720">
-              <a:spAutoFit/>
-            </a:bodyPr>
-            <a:lstStyle/>
-            <a:p>
-              <a:pPr algn="ctr"/>
-              <a:r>
-                <a:rPr lang="pt-BR" dirty="0" smtClean="0">
-                  <a:ln w="0"/>
-                  <a:effectLst>
-                    <a:outerShdw blurRad="38100" dist="19050" dir="2700000" algn="tl" rotWithShape="0">
-                      <a:schemeClr val="dk1">
-                        <a:alpha val="40000"/>
-                      </a:schemeClr>
-                    </a:outerShdw>
-                  </a:effectLst>
-                  <a:latin typeface="Exo 2 Extra Light" panose="00000300000000000000" pitchFamily="50" charset="0"/>
-                </a:rPr>
-                <a:t>SQL Server</a:t>
-              </a:r>
-              <a:endParaRPr lang="pt-BR" dirty="0">
-                <a:ln w="0"/>
-                <a:effectLst>
-                  <a:outerShdw blurRad="38100" dist="19050" dir="2700000" algn="tl" rotWithShape="0">
-                    <a:schemeClr val="dk1">
-                      <a:alpha val="40000"/>
-                    </a:schemeClr>
-                  </a:outerShdw>
-                </a:effectLst>
-                <a:latin typeface="Exo 2 Extra Light" panose="00000300000000000000" pitchFamily="50" charset="0"/>
-              </a:endParaRPr>
-            </a:p>
-          </p:txBody>
-        </p:sp>
-      </p:grpSp>
       <p:sp>
         <p:nvSpPr>
           <p:cNvPr id="44" name="Retângulo 43"/>
@@ -6544,7 +6707,7 @@
         </p:nvGrpSpPr>
         <p:grpSpPr>
           <a:xfrm>
-            <a:off x="8545258" y="1976564"/>
+            <a:off x="8516230" y="1976564"/>
             <a:ext cx="1586444" cy="2795018"/>
             <a:chOff x="1628430" y="2363960"/>
             <a:chExt cx="2117548" cy="1309136"/>
@@ -6704,9 +6867,9 @@
         </p:nvGrpSpPr>
         <p:grpSpPr>
           <a:xfrm>
-            <a:off x="6118367" y="1966613"/>
-            <a:ext cx="1246980" cy="1309136"/>
-            <a:chOff x="1340306" y="2363960"/>
+            <a:off x="6080725" y="1966613"/>
+            <a:ext cx="1246980" cy="547897"/>
+            <a:chOff x="1321551" y="2363960"/>
             <a:chExt cx="2715007" cy="1309136"/>
           </a:xfrm>
         </p:grpSpPr>
@@ -6761,7 +6924,7 @@
           </p:nvSpPr>
           <p:spPr>
             <a:xfrm>
-              <a:off x="1340306" y="2790678"/>
+              <a:off x="1321551" y="2547403"/>
               <a:ext cx="2715007" cy="369332"/>
             </a:xfrm>
             <a:prstGeom prst="rect">
@@ -6805,23 +6968,383 @@
           </p:txBody>
         </p:sp>
       </p:grpSp>
+      <p:sp>
+        <p:nvSpPr>
+          <p:cNvPr id="65" name="Retângulo 64"/>
+          <p:cNvSpPr/>
+          <p:nvPr/>
+        </p:nvSpPr>
+        <p:spPr>
+          <a:xfrm>
+            <a:off x="5948746" y="1549355"/>
+            <a:ext cx="1961691" cy="400110"/>
+          </a:xfrm>
+          <a:prstGeom prst="rect">
+            <a:avLst/>
+          </a:prstGeom>
+          <a:noFill/>
+        </p:spPr>
+        <p:txBody>
+          <a:bodyPr wrap="square" lIns="91440" tIns="45720" rIns="91440" bIns="45720">
+            <a:spAutoFit/>
+          </a:bodyPr>
+          <a:lstStyle/>
+          <a:p>
+            <a:pPr algn="ctr"/>
+            <a:r>
+              <a:rPr lang="pt-BR" sz="2000" b="1" cap="none" spc="0" dirty="0" smtClean="0">
+                <a:ln w="0"/>
+                <a:solidFill>
+                  <a:schemeClr val="bg1"/>
+                </a:solidFill>
+                <a:effectLst>
+                  <a:outerShdw blurRad="38100" dist="19050" dir="2700000" algn="tl" rotWithShape="0">
+                    <a:schemeClr val="dk1">
+                      <a:alpha val="40000"/>
+                    </a:schemeClr>
+                  </a:outerShdw>
+                </a:effectLst>
+                <a:latin typeface="Exo 2 Extra Light" panose="00000300000000000000" pitchFamily="50" charset="0"/>
+              </a:rPr>
+              <a:t>Aplicação Web</a:t>
+            </a:r>
+            <a:endParaRPr lang="pt-BR" sz="2000" b="1" cap="none" spc="0" dirty="0">
+              <a:ln w="0"/>
+              <a:solidFill>
+                <a:schemeClr val="bg1"/>
+              </a:solidFill>
+              <a:effectLst>
+                <a:outerShdw blurRad="38100" dist="19050" dir="2700000" algn="tl" rotWithShape="0">
+                  <a:schemeClr val="dk1">
+                    <a:alpha val="40000"/>
+                  </a:schemeClr>
+                </a:outerShdw>
+              </a:effectLst>
+              <a:latin typeface="Exo 2 Extra Light" panose="00000300000000000000" pitchFamily="50" charset="0"/>
+            </a:endParaRPr>
+          </a:p>
+        </p:txBody>
+      </p:sp>
+      <p:cxnSp>
+        <p:nvCxnSpPr>
+          <p:cNvPr id="75" name="Conector reto 74"/>
+          <p:cNvCxnSpPr/>
+          <p:nvPr/>
+        </p:nvCxnSpPr>
+        <p:spPr>
+          <a:xfrm>
+            <a:off x="7264546" y="3732191"/>
+            <a:ext cx="1255053" cy="0"/>
+          </a:xfrm>
+          <a:prstGeom prst="line">
+            <a:avLst/>
+          </a:prstGeom>
+          <a:ln w="57150">
+            <a:solidFill>
+              <a:schemeClr val="bg1"/>
+            </a:solidFill>
+            <a:headEnd type="arrow" w="med" len="med"/>
+            <a:tailEnd type="none" w="med" len="med"/>
+          </a:ln>
+        </p:spPr>
+        <p:style>
+          <a:lnRef idx="1">
+            <a:schemeClr val="accent1"/>
+          </a:lnRef>
+          <a:fillRef idx="0">
+            <a:schemeClr val="accent1"/>
+          </a:fillRef>
+          <a:effectRef idx="0">
+            <a:schemeClr val="accent1"/>
+          </a:effectRef>
+          <a:fontRef idx="minor">
+            <a:schemeClr val="tx1"/>
+          </a:fontRef>
+        </p:style>
+      </p:cxnSp>
+      <p:sp>
+        <p:nvSpPr>
+          <p:cNvPr id="77" name="Retângulo 76"/>
+          <p:cNvSpPr/>
+          <p:nvPr/>
+        </p:nvSpPr>
+        <p:spPr>
+          <a:xfrm>
+            <a:off x="7115636" y="2756110"/>
+            <a:ext cx="1560207" cy="369332"/>
+          </a:xfrm>
+          <a:prstGeom prst="rect">
+            <a:avLst/>
+          </a:prstGeom>
+          <a:noFill/>
+        </p:spPr>
+        <p:txBody>
+          <a:bodyPr wrap="square" lIns="91440" tIns="45720" rIns="91440" bIns="45720">
+            <a:spAutoFit/>
+          </a:bodyPr>
+          <a:lstStyle/>
+          <a:p>
+            <a:pPr algn="ctr"/>
+            <a:r>
+              <a:rPr lang="pt-BR" b="1" cap="none" spc="0" dirty="0" smtClean="0">
+                <a:ln w="0"/>
+                <a:solidFill>
+                  <a:schemeClr val="bg1"/>
+                </a:solidFill>
+                <a:effectLst>
+                  <a:outerShdw blurRad="38100" dist="19050" dir="2700000" algn="tl" rotWithShape="0">
+                    <a:schemeClr val="dk1">
+                      <a:alpha val="40000"/>
+                    </a:schemeClr>
+                  </a:outerShdw>
+                </a:effectLst>
+                <a:latin typeface="Exo 2 Extra Light" panose="00000300000000000000" pitchFamily="50" charset="0"/>
+              </a:rPr>
+              <a:t>Requisição</a:t>
+            </a:r>
+            <a:endParaRPr lang="pt-BR" b="1" cap="none" spc="0" dirty="0">
+              <a:ln w="0"/>
+              <a:solidFill>
+                <a:schemeClr val="bg1"/>
+              </a:solidFill>
+              <a:effectLst>
+                <a:outerShdw blurRad="38100" dist="19050" dir="2700000" algn="tl" rotWithShape="0">
+                  <a:schemeClr val="dk1">
+                    <a:alpha val="40000"/>
+                  </a:schemeClr>
+                </a:outerShdw>
+              </a:effectLst>
+              <a:latin typeface="Exo 2 Extra Light" panose="00000300000000000000" pitchFamily="50" charset="0"/>
+            </a:endParaRPr>
+          </a:p>
+        </p:txBody>
+      </p:sp>
+      <p:sp>
+        <p:nvSpPr>
+          <p:cNvPr id="78" name="Retângulo 77"/>
+          <p:cNvSpPr/>
+          <p:nvPr/>
+        </p:nvSpPr>
+        <p:spPr>
+          <a:xfrm>
+            <a:off x="7130332" y="3278388"/>
+            <a:ext cx="1560207" cy="369332"/>
+          </a:xfrm>
+          <a:prstGeom prst="rect">
+            <a:avLst/>
+          </a:prstGeom>
+          <a:noFill/>
+        </p:spPr>
+        <p:txBody>
+          <a:bodyPr wrap="square" lIns="91440" tIns="45720" rIns="91440" bIns="45720">
+            <a:spAutoFit/>
+          </a:bodyPr>
+          <a:lstStyle/>
+          <a:p>
+            <a:pPr algn="ctr"/>
+            <a:r>
+              <a:rPr lang="pt-BR" b="1" cap="none" spc="0" dirty="0" smtClean="0">
+                <a:ln w="0"/>
+                <a:solidFill>
+                  <a:schemeClr val="bg1"/>
+                </a:solidFill>
+                <a:effectLst>
+                  <a:outerShdw blurRad="38100" dist="19050" dir="2700000" algn="tl" rotWithShape="0">
+                    <a:schemeClr val="dk1">
+                      <a:alpha val="40000"/>
+                    </a:schemeClr>
+                  </a:outerShdw>
+                </a:effectLst>
+                <a:latin typeface="Exo 2 Extra Light" panose="00000300000000000000" pitchFamily="50" charset="0"/>
+              </a:rPr>
+              <a:t>Resposta</a:t>
+            </a:r>
+            <a:endParaRPr lang="pt-BR" b="1" cap="none" spc="0" dirty="0">
+              <a:ln w="0"/>
+              <a:solidFill>
+                <a:schemeClr val="bg1"/>
+              </a:solidFill>
+              <a:effectLst>
+                <a:outerShdw blurRad="38100" dist="19050" dir="2700000" algn="tl" rotWithShape="0">
+                  <a:schemeClr val="dk1">
+                    <a:alpha val="40000"/>
+                  </a:schemeClr>
+                </a:outerShdw>
+              </a:effectLst>
+              <a:latin typeface="Exo 2 Extra Light" panose="00000300000000000000" pitchFamily="50" charset="0"/>
+            </a:endParaRPr>
+          </a:p>
+        </p:txBody>
+      </p:sp>
+      <p:cxnSp>
+        <p:nvCxnSpPr>
+          <p:cNvPr id="85" name="Conector reto 84"/>
+          <p:cNvCxnSpPr/>
+          <p:nvPr/>
+        </p:nvCxnSpPr>
+        <p:spPr>
+          <a:xfrm flipV="1">
+            <a:off x="6704215" y="4579354"/>
+            <a:ext cx="0" cy="686970"/>
+          </a:xfrm>
+          <a:prstGeom prst="line">
+            <a:avLst/>
+          </a:prstGeom>
+          <a:ln w="57150">
+            <a:solidFill>
+              <a:schemeClr val="bg1"/>
+            </a:solidFill>
+            <a:prstDash val="solid"/>
+          </a:ln>
+        </p:spPr>
+        <p:style>
+          <a:lnRef idx="1">
+            <a:schemeClr val="accent1"/>
+          </a:lnRef>
+          <a:fillRef idx="0">
+            <a:schemeClr val="accent1"/>
+          </a:fillRef>
+          <a:effectRef idx="0">
+            <a:schemeClr val="accent1"/>
+          </a:effectRef>
+          <a:fontRef idx="minor">
+            <a:schemeClr val="tx1"/>
+          </a:fontRef>
+        </p:style>
+      </p:cxnSp>
       <p:grpSp>
         <p:nvGrpSpPr>
-          <p:cNvPr id="57" name="Agrupar 56"/>
+          <p:cNvPr id="79" name="Agrupar 78"/>
           <p:cNvGrpSpPr/>
           <p:nvPr/>
         </p:nvGrpSpPr>
         <p:grpSpPr>
           <a:xfrm>
-            <a:off x="6090484" y="3462446"/>
-            <a:ext cx="1246980" cy="1309136"/>
+            <a:off x="6172623" y="5147374"/>
+            <a:ext cx="1074256" cy="1188269"/>
+            <a:chOff x="6550766" y="5096375"/>
+            <a:chExt cx="1074256" cy="1188269"/>
+          </a:xfrm>
+        </p:grpSpPr>
+        <p:sp>
+          <p:nvSpPr>
+            <p:cNvPr id="43" name="Fluxograma: Disco Magnético 42"/>
+            <p:cNvSpPr/>
+            <p:nvPr/>
+          </p:nvSpPr>
+          <p:spPr>
+            <a:xfrm>
+              <a:off x="6550766" y="5096375"/>
+              <a:ext cx="1074256" cy="1188269"/>
+            </a:xfrm>
+            <a:prstGeom prst="flowChartMagneticDisk">
+              <a:avLst/>
+            </a:prstGeom>
+            <a:solidFill>
+              <a:schemeClr val="bg1"/>
+            </a:solidFill>
+            <a:ln>
+              <a:solidFill>
+                <a:schemeClr val="bg2">
+                  <a:lumMod val="50000"/>
+                </a:schemeClr>
+              </a:solidFill>
+            </a:ln>
+          </p:spPr>
+          <p:style>
+            <a:lnRef idx="2">
+              <a:schemeClr val="accent1">
+                <a:shade val="50000"/>
+              </a:schemeClr>
+            </a:lnRef>
+            <a:fillRef idx="1">
+              <a:schemeClr val="accent1"/>
+            </a:fillRef>
+            <a:effectRef idx="0">
+              <a:schemeClr val="accent1"/>
+            </a:effectRef>
+            <a:fontRef idx="minor">
+              <a:schemeClr val="lt1"/>
+            </a:fontRef>
+          </p:style>
+          <p:txBody>
+            <a:bodyPr rtlCol="0" anchor="ctr"/>
+            <a:lstStyle/>
+            <a:p>
+              <a:pPr algn="ctr"/>
+              <a:endParaRPr lang="pt-BR"/>
+            </a:p>
+          </p:txBody>
+        </p:sp>
+        <p:sp>
+          <p:nvSpPr>
+            <p:cNvPr id="40" name="Retângulo 39"/>
+            <p:cNvSpPr/>
+            <p:nvPr/>
+          </p:nvSpPr>
+          <p:spPr>
+            <a:xfrm>
+              <a:off x="6646532" y="5540423"/>
+              <a:ext cx="882726" cy="646331"/>
+            </a:xfrm>
+            <a:prstGeom prst="rect">
+              <a:avLst/>
+            </a:prstGeom>
+            <a:noFill/>
+          </p:spPr>
+          <p:txBody>
+            <a:bodyPr wrap="square" lIns="91440" tIns="45720" rIns="91440" bIns="45720">
+              <a:spAutoFit/>
+            </a:bodyPr>
+            <a:lstStyle/>
+            <a:p>
+              <a:pPr algn="ctr"/>
+              <a:r>
+                <a:rPr lang="pt-BR" dirty="0" smtClean="0">
+                  <a:ln w="0"/>
+                  <a:effectLst>
+                    <a:outerShdw blurRad="38100" dist="19050" dir="2700000" algn="tl" rotWithShape="0">
+                      <a:schemeClr val="dk1">
+                        <a:alpha val="40000"/>
+                      </a:schemeClr>
+                    </a:outerShdw>
+                  </a:effectLst>
+                  <a:latin typeface="Exo 2 Extra Light" panose="00000300000000000000" pitchFamily="50" charset="0"/>
+                </a:rPr>
+                <a:t>SQL Server</a:t>
+              </a:r>
+              <a:endParaRPr lang="pt-BR" dirty="0">
+                <a:ln w="0"/>
+                <a:effectLst>
+                  <a:outerShdw blurRad="38100" dist="19050" dir="2700000" algn="tl" rotWithShape="0">
+                    <a:schemeClr val="dk1">
+                      <a:alpha val="40000"/>
+                    </a:schemeClr>
+                  </a:outerShdw>
+                </a:effectLst>
+                <a:latin typeface="Exo 2 Extra Light" panose="00000300000000000000" pitchFamily="50" charset="0"/>
+              </a:endParaRPr>
+            </a:p>
+          </p:txBody>
+        </p:sp>
+      </p:grpSp>
+      <p:grpSp>
+        <p:nvGrpSpPr>
+          <p:cNvPr id="72" name="Agrupar 71"/>
+          <p:cNvGrpSpPr/>
+          <p:nvPr/>
+        </p:nvGrpSpPr>
+        <p:grpSpPr>
+          <a:xfrm>
+            <a:off x="6084624" y="2799143"/>
+            <a:ext cx="1246980" cy="1113310"/>
             <a:chOff x="1321551" y="2363960"/>
             <a:chExt cx="2715007" cy="1309136"/>
           </a:xfrm>
         </p:grpSpPr>
         <p:sp>
           <p:nvSpPr>
-            <p:cNvPr id="58" name="Retângulo 57"/>
+            <p:cNvPr id="74" name="Retângulo 73"/>
             <p:cNvSpPr/>
             <p:nvPr/>
           </p:nvSpPr>
@@ -6864,14 +7387,14 @@
         </p:sp>
         <p:sp>
           <p:nvSpPr>
-            <p:cNvPr id="59" name="Retângulo 58"/>
+            <p:cNvPr id="76" name="Retângulo 75"/>
             <p:cNvSpPr/>
             <p:nvPr/>
           </p:nvSpPr>
           <p:spPr>
             <a:xfrm>
-              <a:off x="1321551" y="2849435"/>
-              <a:ext cx="2715007" cy="369332"/>
+              <a:off x="1321551" y="2785738"/>
+              <a:ext cx="2715007" cy="620501"/>
             </a:xfrm>
             <a:prstGeom prst="rect">
               <a:avLst/>
@@ -6899,75 +7422,8 @@
                 </a:rPr>
                 <a:t>Controller</a:t>
               </a:r>
-            </a:p>
-          </p:txBody>
-        </p:sp>
-      </p:grpSp>
-      <p:cxnSp>
-        <p:nvCxnSpPr>
-          <p:cNvPr id="60" name="Conector reto 59"/>
-          <p:cNvCxnSpPr/>
-          <p:nvPr/>
-        </p:nvCxnSpPr>
-        <p:spPr>
-          <a:xfrm flipV="1">
-            <a:off x="6733243" y="3016117"/>
-            <a:ext cx="0" cy="686970"/>
-          </a:xfrm>
-          <a:prstGeom prst="line">
-            <a:avLst/>
-          </a:prstGeom>
-          <a:ln w="57150">
-            <a:solidFill>
-              <a:schemeClr val="bg1"/>
-            </a:solidFill>
-            <a:prstDash val="solid"/>
-          </a:ln>
-        </p:spPr>
-        <p:style>
-          <a:lnRef idx="1">
-            <a:schemeClr val="accent1"/>
-          </a:lnRef>
-          <a:fillRef idx="0">
-            <a:schemeClr val="accent1"/>
-          </a:fillRef>
-          <a:effectRef idx="0">
-            <a:schemeClr val="accent1"/>
-          </a:effectRef>
-          <a:fontRef idx="minor">
-            <a:schemeClr val="tx1"/>
-          </a:fontRef>
-        </p:style>
-      </p:cxnSp>
-      <p:sp>
-        <p:nvSpPr>
-          <p:cNvPr id="65" name="Retângulo 64"/>
-          <p:cNvSpPr/>
-          <p:nvPr/>
-        </p:nvSpPr>
-        <p:spPr>
-          <a:xfrm>
-            <a:off x="5977774" y="1549355"/>
-            <a:ext cx="1961691" cy="400110"/>
-          </a:xfrm>
-          <a:prstGeom prst="rect">
-            <a:avLst/>
-          </a:prstGeom>
-          <a:noFill/>
-        </p:spPr>
-        <p:txBody>
-          <a:bodyPr wrap="square" lIns="91440" tIns="45720" rIns="91440" bIns="45720">
-            <a:spAutoFit/>
-          </a:bodyPr>
-          <a:lstStyle/>
-          <a:p>
-            <a:pPr algn="ctr"/>
-            <a:r>
-              <a:rPr lang="pt-BR" sz="2000" b="1" cap="none" spc="0" dirty="0" smtClean="0">
+              <a:endParaRPr lang="pt-BR" dirty="0">
                 <a:ln w="0"/>
-                <a:solidFill>
-                  <a:schemeClr val="bg1"/>
-                </a:solidFill>
                 <a:effectLst>
                   <a:outerShdw blurRad="38100" dist="19050" dir="2700000" algn="tl" rotWithShape="0">
                     <a:schemeClr val="dk1">
@@ -6976,92 +7432,107 @@
                   </a:outerShdw>
                 </a:effectLst>
                 <a:latin typeface="Exo 2 Extra Light" panose="00000300000000000000" pitchFamily="50" charset="0"/>
-              </a:rPr>
-              <a:t>Aplicação Web</a:t>
-            </a:r>
-            <a:endParaRPr lang="pt-BR" sz="2000" b="1" cap="none" spc="0" dirty="0">
-              <a:ln w="0"/>
-              <a:solidFill>
-                <a:schemeClr val="bg1"/>
-              </a:solidFill>
-              <a:effectLst>
-                <a:outerShdw blurRad="38100" dist="19050" dir="2700000" algn="tl" rotWithShape="0">
-                  <a:schemeClr val="dk1">
-                    <a:alpha val="40000"/>
-                  </a:schemeClr>
-                </a:outerShdw>
-              </a:effectLst>
-              <a:latin typeface="Exo 2 Extra Light" panose="00000300000000000000" pitchFamily="50" charset="0"/>
-            </a:endParaRPr>
-          </a:p>
-        </p:txBody>
-      </p:sp>
-      <p:cxnSp>
-        <p:nvCxnSpPr>
-          <p:cNvPr id="75" name="Conector reto 74"/>
-          <p:cNvCxnSpPr/>
+              </a:endParaRPr>
+            </a:p>
+          </p:txBody>
+        </p:sp>
+      </p:grpSp>
+      <p:grpSp>
+        <p:nvGrpSpPr>
+          <p:cNvPr id="89" name="Agrupar 88"/>
+          <p:cNvGrpSpPr/>
           <p:nvPr/>
-        </p:nvCxnSpPr>
-        <p:spPr>
+        </p:nvGrpSpPr>
+        <p:grpSpPr>
           <a:xfrm>
-            <a:off x="7293574" y="4534011"/>
-            <a:ext cx="1255053" cy="0"/>
+            <a:off x="6080725" y="4243689"/>
+            <a:ext cx="1246980" cy="547897"/>
+            <a:chOff x="1321551" y="2363960"/>
+            <a:chExt cx="2715007" cy="1309136"/>
           </a:xfrm>
-          <a:prstGeom prst="line">
-            <a:avLst/>
-          </a:prstGeom>
-          <a:ln w="57150">
+        </p:grpSpPr>
+        <p:sp>
+          <p:nvSpPr>
+            <p:cNvPr id="90" name="Retângulo 89"/>
+            <p:cNvSpPr/>
+            <p:nvPr/>
+          </p:nvSpPr>
+          <p:spPr>
+            <a:xfrm>
+              <a:off x="1424447" y="2363960"/>
+              <a:ext cx="2509216" cy="1309136"/>
+            </a:xfrm>
+            <a:prstGeom prst="rect">
+              <a:avLst/>
+            </a:prstGeom>
             <a:solidFill>
               <a:schemeClr val="bg1"/>
             </a:solidFill>
-            <a:headEnd type="arrow" w="med" len="med"/>
-            <a:tailEnd type="none" w="med" len="med"/>
-          </a:ln>
-        </p:spPr>
-        <p:style>
-          <a:lnRef idx="1">
-            <a:schemeClr val="accent1"/>
-          </a:lnRef>
-          <a:fillRef idx="0">
-            <a:schemeClr val="accent1"/>
-          </a:fillRef>
-          <a:effectRef idx="0">
-            <a:schemeClr val="accent1"/>
-          </a:effectRef>
-          <a:fontRef idx="minor">
-            <a:schemeClr val="tx1"/>
-          </a:fontRef>
-        </p:style>
-      </p:cxnSp>
-      <p:sp>
-        <p:nvSpPr>
-          <p:cNvPr id="77" name="Retângulo 76"/>
-          <p:cNvSpPr/>
-          <p:nvPr/>
-        </p:nvSpPr>
-        <p:spPr>
-          <a:xfrm>
-            <a:off x="7144664" y="3455574"/>
-            <a:ext cx="1560207" cy="369332"/>
-          </a:xfrm>
-          <a:prstGeom prst="rect">
-            <a:avLst/>
-          </a:prstGeom>
-          <a:noFill/>
-        </p:spPr>
-        <p:txBody>
-          <a:bodyPr wrap="square" lIns="91440" tIns="45720" rIns="91440" bIns="45720">
-            <a:spAutoFit/>
-          </a:bodyPr>
-          <a:lstStyle/>
-          <a:p>
-            <a:pPr algn="ctr"/>
-            <a:r>
-              <a:rPr lang="pt-BR" b="1" cap="none" spc="0" dirty="0" smtClean="0">
+          </p:spPr>
+          <p:style>
+            <a:lnRef idx="2">
+              <a:schemeClr val="accent1">
+                <a:shade val="50000"/>
+              </a:schemeClr>
+            </a:lnRef>
+            <a:fillRef idx="1">
+              <a:schemeClr val="accent1"/>
+            </a:fillRef>
+            <a:effectRef idx="0">
+              <a:schemeClr val="accent1"/>
+            </a:effectRef>
+            <a:fontRef idx="minor">
+              <a:schemeClr val="lt1"/>
+            </a:fontRef>
+          </p:style>
+          <p:txBody>
+            <a:bodyPr rtlCol="0" anchor="ctr"/>
+            <a:lstStyle/>
+            <a:p>
+              <a:pPr algn="ctr"/>
+              <a:endParaRPr lang="pt-BR" dirty="0"/>
+            </a:p>
+          </p:txBody>
+        </p:sp>
+        <p:sp>
+          <p:nvSpPr>
+            <p:cNvPr id="91" name="Retângulo 90"/>
+            <p:cNvSpPr/>
+            <p:nvPr/>
+          </p:nvSpPr>
+          <p:spPr>
+            <a:xfrm>
+              <a:off x="1321551" y="2547403"/>
+              <a:ext cx="2715007" cy="882476"/>
+            </a:xfrm>
+            <a:prstGeom prst="rect">
+              <a:avLst/>
+            </a:prstGeom>
+            <a:noFill/>
+          </p:spPr>
+          <p:txBody>
+            <a:bodyPr wrap="square" lIns="91440" tIns="45720" rIns="91440" bIns="45720">
+              <a:spAutoFit/>
+            </a:bodyPr>
+            <a:lstStyle/>
+            <a:p>
+              <a:pPr algn="ctr"/>
+              <a:r>
+                <a:rPr lang="pt-BR" dirty="0" smtClean="0">
+                  <a:ln w="0"/>
+                  <a:effectLst>
+                    <a:outerShdw blurRad="38100" dist="19050" dir="2700000" algn="tl" rotWithShape="0">
+                      <a:schemeClr val="dk1">
+                        <a:alpha val="40000"/>
+                      </a:schemeClr>
+                    </a:outerShdw>
+                  </a:effectLst>
+                  <a:latin typeface="Exo 2 Extra Light" panose="00000300000000000000" pitchFamily="50" charset="0"/>
+                </a:rPr>
+                <a:t>Services</a:t>
+              </a:r>
+              <a:endParaRPr lang="pt-BR" dirty="0">
                 <a:ln w="0"/>
-                <a:solidFill>
-                  <a:schemeClr val="bg1"/>
-                </a:solidFill>
                 <a:effectLst>
                   <a:outerShdw blurRad="38100" dist="19050" dir="2700000" algn="tl" rotWithShape="0">
                     <a:schemeClr val="dk1">
@@ -7070,83 +7541,11 @@
                   </a:outerShdw>
                 </a:effectLst>
                 <a:latin typeface="Exo 2 Extra Light" panose="00000300000000000000" pitchFamily="50" charset="0"/>
-              </a:rPr>
-              <a:t>Requisição</a:t>
-            </a:r>
-            <a:endParaRPr lang="pt-BR" b="1" cap="none" spc="0" dirty="0">
-              <a:ln w="0"/>
-              <a:solidFill>
-                <a:schemeClr val="bg1"/>
-              </a:solidFill>
-              <a:effectLst>
-                <a:outerShdw blurRad="38100" dist="19050" dir="2700000" algn="tl" rotWithShape="0">
-                  <a:schemeClr val="dk1">
-                    <a:alpha val="40000"/>
-                  </a:schemeClr>
-                </a:outerShdw>
-              </a:effectLst>
-              <a:latin typeface="Exo 2 Extra Light" panose="00000300000000000000" pitchFamily="50" charset="0"/>
-            </a:endParaRPr>
-          </a:p>
-        </p:txBody>
-      </p:sp>
-      <p:sp>
-        <p:nvSpPr>
-          <p:cNvPr id="78" name="Retângulo 77"/>
-          <p:cNvSpPr/>
-          <p:nvPr/>
-        </p:nvSpPr>
-        <p:spPr>
-          <a:xfrm>
-            <a:off x="7159360" y="4052947"/>
-            <a:ext cx="1560207" cy="369332"/>
-          </a:xfrm>
-          <a:prstGeom prst="rect">
-            <a:avLst/>
-          </a:prstGeom>
-          <a:noFill/>
-        </p:spPr>
-        <p:txBody>
-          <a:bodyPr wrap="square" lIns="91440" tIns="45720" rIns="91440" bIns="45720">
-            <a:spAutoFit/>
-          </a:bodyPr>
-          <a:lstStyle/>
-          <a:p>
-            <a:pPr algn="ctr"/>
-            <a:r>
-              <a:rPr lang="pt-BR" b="1" cap="none" spc="0" dirty="0" smtClean="0">
-                <a:ln w="0"/>
-                <a:solidFill>
-                  <a:schemeClr val="bg1"/>
-                </a:solidFill>
-                <a:effectLst>
-                  <a:outerShdw blurRad="38100" dist="19050" dir="2700000" algn="tl" rotWithShape="0">
-                    <a:schemeClr val="dk1">
-                      <a:alpha val="40000"/>
-                    </a:schemeClr>
-                  </a:outerShdw>
-                </a:effectLst>
-                <a:latin typeface="Exo 2 Extra Light" panose="00000300000000000000" pitchFamily="50" charset="0"/>
-              </a:rPr>
-              <a:t>Resposta</a:t>
-            </a:r>
-            <a:endParaRPr lang="pt-BR" b="1" cap="none" spc="0" dirty="0">
-              <a:ln w="0"/>
-              <a:solidFill>
-                <a:schemeClr val="bg1"/>
-              </a:solidFill>
-              <a:effectLst>
-                <a:outerShdw blurRad="38100" dist="19050" dir="2700000" algn="tl" rotWithShape="0">
-                  <a:schemeClr val="dk1">
-                    <a:alpha val="40000"/>
-                  </a:schemeClr>
-                </a:outerShdw>
-              </a:effectLst>
-              <a:latin typeface="Exo 2 Extra Light" panose="00000300000000000000" pitchFamily="50" charset="0"/>
-            </a:endParaRPr>
-          </a:p>
-        </p:txBody>
-      </p:sp>
+              </a:endParaRPr>
+            </a:p>
+          </p:txBody>
+        </p:sp>
+      </p:grpSp>
     </p:spTree>
     <p:extLst>
       <p:ext uri="{BB962C8B-B14F-4D97-AF65-F5344CB8AC3E}">
@@ -7160,9 +7559,977 @@
   <p:timing>
     <p:tnLst>
       <p:par>
-        <p:cTn id="1" dur="indefinite" restart="never" nodeType="tmRoot"/>
+        <p:cTn id="1" dur="indefinite" restart="never" nodeType="tmRoot">
+          <p:childTnLst>
+            <p:seq concurrent="1" nextAc="seek">
+              <p:cTn id="2" dur="indefinite" nodeType="mainSeq">
+                <p:childTnLst>
+                  <p:par>
+                    <p:cTn id="3" fill="hold">
+                      <p:stCondLst>
+                        <p:cond delay="indefinite"/>
+                        <p:cond evt="onBegin" delay="0">
+                          <p:tn val="2"/>
+                        </p:cond>
+                      </p:stCondLst>
+                      <p:childTnLst>
+                        <p:par>
+                          <p:cTn id="4" fill="hold">
+                            <p:stCondLst>
+                              <p:cond delay="0"/>
+                            </p:stCondLst>
+                            <p:childTnLst>
+                              <p:par>
+                                <p:cTn id="5" presetID="10" presetClass="entr" presetSubtype="0" fill="hold" grpId="0" nodeType="afterEffect">
+                                  <p:stCondLst>
+                                    <p:cond delay="0"/>
+                                  </p:stCondLst>
+                                  <p:childTnLst>
+                                    <p:set>
+                                      <p:cBhvr>
+                                        <p:cTn id="6" dur="1" fill="hold">
+                                          <p:stCondLst>
+                                            <p:cond delay="0"/>
+                                          </p:stCondLst>
+                                        </p:cTn>
+                                        <p:tgtEl>
+                                          <p:spTgt spid="63"/>
+                                        </p:tgtEl>
+                                        <p:attrNameLst>
+                                          <p:attrName>style.visibility</p:attrName>
+                                        </p:attrNameLst>
+                                      </p:cBhvr>
+                                      <p:to>
+                                        <p:strVal val="visible"/>
+                                      </p:to>
+                                    </p:set>
+                                    <p:animEffect transition="in" filter="fade">
+                                      <p:cBhvr>
+                                        <p:cTn id="7" dur="500"/>
+                                        <p:tgtEl>
+                                          <p:spTgt spid="63"/>
+                                        </p:tgtEl>
+                                      </p:cBhvr>
+                                    </p:animEffect>
+                                  </p:childTnLst>
+                                </p:cTn>
+                              </p:par>
+                              <p:par>
+                                <p:cTn id="8" presetID="10" presetClass="entr" presetSubtype="0" fill="hold" nodeType="withEffect">
+                                  <p:stCondLst>
+                                    <p:cond delay="0"/>
+                                  </p:stCondLst>
+                                  <p:childTnLst>
+                                    <p:set>
+                                      <p:cBhvr>
+                                        <p:cTn id="9" dur="1" fill="hold">
+                                          <p:stCondLst>
+                                            <p:cond delay="0"/>
+                                          </p:stCondLst>
+                                        </p:cTn>
+                                        <p:tgtEl>
+                                          <p:spTgt spid="16"/>
+                                        </p:tgtEl>
+                                        <p:attrNameLst>
+                                          <p:attrName>style.visibility</p:attrName>
+                                        </p:attrNameLst>
+                                      </p:cBhvr>
+                                      <p:to>
+                                        <p:strVal val="visible"/>
+                                      </p:to>
+                                    </p:set>
+                                    <p:animEffect transition="in" filter="fade">
+                                      <p:cBhvr>
+                                        <p:cTn id="10" dur="500"/>
+                                        <p:tgtEl>
+                                          <p:spTgt spid="16"/>
+                                        </p:tgtEl>
+                                      </p:cBhvr>
+                                    </p:animEffect>
+                                  </p:childTnLst>
+                                </p:cTn>
+                              </p:par>
+                              <p:par>
+                                <p:cTn id="11" presetID="10" presetClass="entr" presetSubtype="0" fill="hold" grpId="0" nodeType="withEffect">
+                                  <p:stCondLst>
+                                    <p:cond delay="0"/>
+                                  </p:stCondLst>
+                                  <p:childTnLst>
+                                    <p:set>
+                                      <p:cBhvr>
+                                        <p:cTn id="12" dur="1" fill="hold">
+                                          <p:stCondLst>
+                                            <p:cond delay="0"/>
+                                          </p:stCondLst>
+                                        </p:cTn>
+                                        <p:tgtEl>
+                                          <p:spTgt spid="18"/>
+                                        </p:tgtEl>
+                                        <p:attrNameLst>
+                                          <p:attrName>style.visibility</p:attrName>
+                                        </p:attrNameLst>
+                                      </p:cBhvr>
+                                      <p:to>
+                                        <p:strVal val="visible"/>
+                                      </p:to>
+                                    </p:set>
+                                    <p:animEffect transition="in" filter="fade">
+                                      <p:cBhvr>
+                                        <p:cTn id="13" dur="500"/>
+                                        <p:tgtEl>
+                                          <p:spTgt spid="18"/>
+                                        </p:tgtEl>
+                                      </p:cBhvr>
+                                    </p:animEffect>
+                                  </p:childTnLst>
+                                </p:cTn>
+                              </p:par>
+                              <p:par>
+                                <p:cTn id="14" presetID="10" presetClass="entr" presetSubtype="0" fill="hold" nodeType="withEffect">
+                                  <p:stCondLst>
+                                    <p:cond delay="0"/>
+                                  </p:stCondLst>
+                                  <p:childTnLst>
+                                    <p:set>
+                                      <p:cBhvr>
+                                        <p:cTn id="15" dur="1" fill="hold">
+                                          <p:stCondLst>
+                                            <p:cond delay="0"/>
+                                          </p:stCondLst>
+                                        </p:cTn>
+                                        <p:tgtEl>
+                                          <p:spTgt spid="19"/>
+                                        </p:tgtEl>
+                                        <p:attrNameLst>
+                                          <p:attrName>style.visibility</p:attrName>
+                                        </p:attrNameLst>
+                                      </p:cBhvr>
+                                      <p:to>
+                                        <p:strVal val="visible"/>
+                                      </p:to>
+                                    </p:set>
+                                    <p:animEffect transition="in" filter="fade">
+                                      <p:cBhvr>
+                                        <p:cTn id="16" dur="500"/>
+                                        <p:tgtEl>
+                                          <p:spTgt spid="19"/>
+                                        </p:tgtEl>
+                                      </p:cBhvr>
+                                    </p:animEffect>
+                                  </p:childTnLst>
+                                </p:cTn>
+                              </p:par>
+                              <p:par>
+                                <p:cTn id="17" presetID="10" presetClass="entr" presetSubtype="0" fill="hold" grpId="0" nodeType="withEffect">
+                                  <p:stCondLst>
+                                    <p:cond delay="0"/>
+                                  </p:stCondLst>
+                                  <p:childTnLst>
+                                    <p:set>
+                                      <p:cBhvr>
+                                        <p:cTn id="18" dur="1" fill="hold">
+                                          <p:stCondLst>
+                                            <p:cond delay="0"/>
+                                          </p:stCondLst>
+                                        </p:cTn>
+                                        <p:tgtEl>
+                                          <p:spTgt spid="22"/>
+                                        </p:tgtEl>
+                                        <p:attrNameLst>
+                                          <p:attrName>style.visibility</p:attrName>
+                                        </p:attrNameLst>
+                                      </p:cBhvr>
+                                      <p:to>
+                                        <p:strVal val="visible"/>
+                                      </p:to>
+                                    </p:set>
+                                    <p:animEffect transition="in" filter="fade">
+                                      <p:cBhvr>
+                                        <p:cTn id="19" dur="500"/>
+                                        <p:tgtEl>
+                                          <p:spTgt spid="22"/>
+                                        </p:tgtEl>
+                                      </p:cBhvr>
+                                    </p:animEffect>
+                                  </p:childTnLst>
+                                </p:cTn>
+                              </p:par>
+                              <p:par>
+                                <p:cTn id="20" presetID="10" presetClass="entr" presetSubtype="0" fill="hold" grpId="0" nodeType="withEffect">
+                                  <p:stCondLst>
+                                    <p:cond delay="0"/>
+                                  </p:stCondLst>
+                                  <p:childTnLst>
+                                    <p:set>
+                                      <p:cBhvr>
+                                        <p:cTn id="21" dur="1" fill="hold">
+                                          <p:stCondLst>
+                                            <p:cond delay="0"/>
+                                          </p:stCondLst>
+                                        </p:cTn>
+                                        <p:tgtEl>
+                                          <p:spTgt spid="23"/>
+                                        </p:tgtEl>
+                                        <p:attrNameLst>
+                                          <p:attrName>style.visibility</p:attrName>
+                                        </p:attrNameLst>
+                                      </p:cBhvr>
+                                      <p:to>
+                                        <p:strVal val="visible"/>
+                                      </p:to>
+                                    </p:set>
+                                    <p:animEffect transition="in" filter="fade">
+                                      <p:cBhvr>
+                                        <p:cTn id="22" dur="500"/>
+                                        <p:tgtEl>
+                                          <p:spTgt spid="23"/>
+                                        </p:tgtEl>
+                                      </p:cBhvr>
+                                    </p:animEffect>
+                                  </p:childTnLst>
+                                </p:cTn>
+                              </p:par>
+                              <p:par>
+                                <p:cTn id="23" presetID="10" presetClass="entr" presetSubtype="0" fill="hold" grpId="0" nodeType="withEffect">
+                                  <p:stCondLst>
+                                    <p:cond delay="0"/>
+                                  </p:stCondLst>
+                                  <p:childTnLst>
+                                    <p:set>
+                                      <p:cBhvr>
+                                        <p:cTn id="24" dur="1" fill="hold">
+                                          <p:stCondLst>
+                                            <p:cond delay="0"/>
+                                          </p:stCondLst>
+                                        </p:cTn>
+                                        <p:tgtEl>
+                                          <p:spTgt spid="24"/>
+                                        </p:tgtEl>
+                                        <p:attrNameLst>
+                                          <p:attrName>style.visibility</p:attrName>
+                                        </p:attrNameLst>
+                                      </p:cBhvr>
+                                      <p:to>
+                                        <p:strVal val="visible"/>
+                                      </p:to>
+                                    </p:set>
+                                    <p:animEffect transition="in" filter="fade">
+                                      <p:cBhvr>
+                                        <p:cTn id="25" dur="500"/>
+                                        <p:tgtEl>
+                                          <p:spTgt spid="24"/>
+                                        </p:tgtEl>
+                                      </p:cBhvr>
+                                    </p:animEffect>
+                                  </p:childTnLst>
+                                </p:cTn>
+                              </p:par>
+                              <p:par>
+                                <p:cTn id="26" presetID="10" presetClass="entr" presetSubtype="0" fill="hold" nodeType="withEffect">
+                                  <p:stCondLst>
+                                    <p:cond delay="0"/>
+                                  </p:stCondLst>
+                                  <p:childTnLst>
+                                    <p:set>
+                                      <p:cBhvr>
+                                        <p:cTn id="27" dur="1" fill="hold">
+                                          <p:stCondLst>
+                                            <p:cond delay="0"/>
+                                          </p:stCondLst>
+                                        </p:cTn>
+                                        <p:tgtEl>
+                                          <p:spTgt spid="26"/>
+                                        </p:tgtEl>
+                                        <p:attrNameLst>
+                                          <p:attrName>style.visibility</p:attrName>
+                                        </p:attrNameLst>
+                                      </p:cBhvr>
+                                      <p:to>
+                                        <p:strVal val="visible"/>
+                                      </p:to>
+                                    </p:set>
+                                    <p:animEffect transition="in" filter="fade">
+                                      <p:cBhvr>
+                                        <p:cTn id="28" dur="500"/>
+                                        <p:tgtEl>
+                                          <p:spTgt spid="26"/>
+                                        </p:tgtEl>
+                                      </p:cBhvr>
+                                    </p:animEffect>
+                                  </p:childTnLst>
+                                </p:cTn>
+                              </p:par>
+                              <p:par>
+                                <p:cTn id="29" presetID="10" presetClass="entr" presetSubtype="0" fill="hold" nodeType="withEffect">
+                                  <p:stCondLst>
+                                    <p:cond delay="0"/>
+                                  </p:stCondLst>
+                                  <p:childTnLst>
+                                    <p:set>
+                                      <p:cBhvr>
+                                        <p:cTn id="30" dur="1" fill="hold">
+                                          <p:stCondLst>
+                                            <p:cond delay="0"/>
+                                          </p:stCondLst>
+                                        </p:cTn>
+                                        <p:tgtEl>
+                                          <p:spTgt spid="73"/>
+                                        </p:tgtEl>
+                                        <p:attrNameLst>
+                                          <p:attrName>style.visibility</p:attrName>
+                                        </p:attrNameLst>
+                                      </p:cBhvr>
+                                      <p:to>
+                                        <p:strVal val="visible"/>
+                                      </p:to>
+                                    </p:set>
+                                    <p:animEffect transition="in" filter="fade">
+                                      <p:cBhvr>
+                                        <p:cTn id="31" dur="500"/>
+                                        <p:tgtEl>
+                                          <p:spTgt spid="73"/>
+                                        </p:tgtEl>
+                                      </p:cBhvr>
+                                    </p:animEffect>
+                                  </p:childTnLst>
+                                </p:cTn>
+                              </p:par>
+                              <p:par>
+                                <p:cTn id="32" presetID="10" presetClass="entr" presetSubtype="0" fill="hold" grpId="0" nodeType="withEffect">
+                                  <p:stCondLst>
+                                    <p:cond delay="0"/>
+                                  </p:stCondLst>
+                                  <p:childTnLst>
+                                    <p:set>
+                                      <p:cBhvr>
+                                        <p:cTn id="33" dur="1" fill="hold">
+                                          <p:stCondLst>
+                                            <p:cond delay="0"/>
+                                          </p:stCondLst>
+                                        </p:cTn>
+                                        <p:tgtEl>
+                                          <p:spTgt spid="30"/>
+                                        </p:tgtEl>
+                                        <p:attrNameLst>
+                                          <p:attrName>style.visibility</p:attrName>
+                                        </p:attrNameLst>
+                                      </p:cBhvr>
+                                      <p:to>
+                                        <p:strVal val="visible"/>
+                                      </p:to>
+                                    </p:set>
+                                    <p:animEffect transition="in" filter="fade">
+                                      <p:cBhvr>
+                                        <p:cTn id="34" dur="500"/>
+                                        <p:tgtEl>
+                                          <p:spTgt spid="30"/>
+                                        </p:tgtEl>
+                                      </p:cBhvr>
+                                    </p:animEffect>
+                                  </p:childTnLst>
+                                </p:cTn>
+                              </p:par>
+                              <p:par>
+                                <p:cTn id="35" presetID="10" presetClass="entr" presetSubtype="0" fill="hold" nodeType="withEffect">
+                                  <p:stCondLst>
+                                    <p:cond delay="0"/>
+                                  </p:stCondLst>
+                                  <p:childTnLst>
+                                    <p:set>
+                                      <p:cBhvr>
+                                        <p:cTn id="36" dur="1" fill="hold">
+                                          <p:stCondLst>
+                                            <p:cond delay="0"/>
+                                          </p:stCondLst>
+                                        </p:cTn>
+                                        <p:tgtEl>
+                                          <p:spTgt spid="80"/>
+                                        </p:tgtEl>
+                                        <p:attrNameLst>
+                                          <p:attrName>style.visibility</p:attrName>
+                                        </p:attrNameLst>
+                                      </p:cBhvr>
+                                      <p:to>
+                                        <p:strVal val="visible"/>
+                                      </p:to>
+                                    </p:set>
+                                    <p:animEffect transition="in" filter="fade">
+                                      <p:cBhvr>
+                                        <p:cTn id="37" dur="500"/>
+                                        <p:tgtEl>
+                                          <p:spTgt spid="80"/>
+                                        </p:tgtEl>
+                                      </p:cBhvr>
+                                    </p:animEffect>
+                                  </p:childTnLst>
+                                </p:cTn>
+                              </p:par>
+                              <p:par>
+                                <p:cTn id="38" presetID="10" presetClass="entr" presetSubtype="0" fill="hold" grpId="0" nodeType="withEffect">
+                                  <p:stCondLst>
+                                    <p:cond delay="0"/>
+                                  </p:stCondLst>
+                                  <p:childTnLst>
+                                    <p:set>
+                                      <p:cBhvr>
+                                        <p:cTn id="39" dur="1" fill="hold">
+                                          <p:stCondLst>
+                                            <p:cond delay="0"/>
+                                          </p:stCondLst>
+                                        </p:cTn>
+                                        <p:tgtEl>
+                                          <p:spTgt spid="32"/>
+                                        </p:tgtEl>
+                                        <p:attrNameLst>
+                                          <p:attrName>style.visibility</p:attrName>
+                                        </p:attrNameLst>
+                                      </p:cBhvr>
+                                      <p:to>
+                                        <p:strVal val="visible"/>
+                                      </p:to>
+                                    </p:set>
+                                    <p:animEffect transition="in" filter="fade">
+                                      <p:cBhvr>
+                                        <p:cTn id="40" dur="500"/>
+                                        <p:tgtEl>
+                                          <p:spTgt spid="32"/>
+                                        </p:tgtEl>
+                                      </p:cBhvr>
+                                    </p:animEffect>
+                                  </p:childTnLst>
+                                </p:cTn>
+                              </p:par>
+                              <p:par>
+                                <p:cTn id="41" presetID="10" presetClass="entr" presetSubtype="0" fill="hold" nodeType="withEffect">
+                                  <p:stCondLst>
+                                    <p:cond delay="0"/>
+                                  </p:stCondLst>
+                                  <p:childTnLst>
+                                    <p:set>
+                                      <p:cBhvr>
+                                        <p:cTn id="42" dur="1" fill="hold">
+                                          <p:stCondLst>
+                                            <p:cond delay="0"/>
+                                          </p:stCondLst>
+                                        </p:cTn>
+                                        <p:tgtEl>
+                                          <p:spTgt spid="60"/>
+                                        </p:tgtEl>
+                                        <p:attrNameLst>
+                                          <p:attrName>style.visibility</p:attrName>
+                                        </p:attrNameLst>
+                                      </p:cBhvr>
+                                      <p:to>
+                                        <p:strVal val="visible"/>
+                                      </p:to>
+                                    </p:set>
+                                    <p:animEffect transition="in" filter="fade">
+                                      <p:cBhvr>
+                                        <p:cTn id="43" dur="500"/>
+                                        <p:tgtEl>
+                                          <p:spTgt spid="60"/>
+                                        </p:tgtEl>
+                                      </p:cBhvr>
+                                    </p:animEffect>
+                                  </p:childTnLst>
+                                </p:cTn>
+                              </p:par>
+                              <p:par>
+                                <p:cTn id="44" presetID="10" presetClass="entr" presetSubtype="0" fill="hold" nodeType="withEffect">
+                                  <p:stCondLst>
+                                    <p:cond delay="0"/>
+                                  </p:stCondLst>
+                                  <p:childTnLst>
+                                    <p:set>
+                                      <p:cBhvr>
+                                        <p:cTn id="45" dur="1" fill="hold">
+                                          <p:stCondLst>
+                                            <p:cond delay="0"/>
+                                          </p:stCondLst>
+                                        </p:cTn>
+                                        <p:tgtEl>
+                                          <p:spTgt spid="35"/>
+                                        </p:tgtEl>
+                                        <p:attrNameLst>
+                                          <p:attrName>style.visibility</p:attrName>
+                                        </p:attrNameLst>
+                                      </p:cBhvr>
+                                      <p:to>
+                                        <p:strVal val="visible"/>
+                                      </p:to>
+                                    </p:set>
+                                    <p:animEffect transition="in" filter="fade">
+                                      <p:cBhvr>
+                                        <p:cTn id="46" dur="500"/>
+                                        <p:tgtEl>
+                                          <p:spTgt spid="35"/>
+                                        </p:tgtEl>
+                                      </p:cBhvr>
+                                    </p:animEffect>
+                                  </p:childTnLst>
+                                </p:cTn>
+                              </p:par>
+                              <p:par>
+                                <p:cTn id="47" presetID="10" presetClass="entr" presetSubtype="0" fill="hold" grpId="0" nodeType="withEffect">
+                                  <p:stCondLst>
+                                    <p:cond delay="0"/>
+                                  </p:stCondLst>
+                                  <p:childTnLst>
+                                    <p:set>
+                                      <p:cBhvr>
+                                        <p:cTn id="48" dur="1" fill="hold">
+                                          <p:stCondLst>
+                                            <p:cond delay="0"/>
+                                          </p:stCondLst>
+                                        </p:cTn>
+                                        <p:tgtEl>
+                                          <p:spTgt spid="37"/>
+                                        </p:tgtEl>
+                                        <p:attrNameLst>
+                                          <p:attrName>style.visibility</p:attrName>
+                                        </p:attrNameLst>
+                                      </p:cBhvr>
+                                      <p:to>
+                                        <p:strVal val="visible"/>
+                                      </p:to>
+                                    </p:set>
+                                    <p:animEffect transition="in" filter="fade">
+                                      <p:cBhvr>
+                                        <p:cTn id="49" dur="500"/>
+                                        <p:tgtEl>
+                                          <p:spTgt spid="37"/>
+                                        </p:tgtEl>
+                                      </p:cBhvr>
+                                    </p:animEffect>
+                                  </p:childTnLst>
+                                </p:cTn>
+                              </p:par>
+                              <p:par>
+                                <p:cTn id="50" presetID="10" presetClass="entr" presetSubtype="0" fill="hold" grpId="0" nodeType="withEffect">
+                                  <p:stCondLst>
+                                    <p:cond delay="0"/>
+                                  </p:stCondLst>
+                                  <p:childTnLst>
+                                    <p:set>
+                                      <p:cBhvr>
+                                        <p:cTn id="51" dur="1" fill="hold">
+                                          <p:stCondLst>
+                                            <p:cond delay="0"/>
+                                          </p:stCondLst>
+                                        </p:cTn>
+                                        <p:tgtEl>
+                                          <p:spTgt spid="44"/>
+                                        </p:tgtEl>
+                                        <p:attrNameLst>
+                                          <p:attrName>style.visibility</p:attrName>
+                                        </p:attrNameLst>
+                                      </p:cBhvr>
+                                      <p:to>
+                                        <p:strVal val="visible"/>
+                                      </p:to>
+                                    </p:set>
+                                    <p:animEffect transition="in" filter="fade">
+                                      <p:cBhvr>
+                                        <p:cTn id="52" dur="500"/>
+                                        <p:tgtEl>
+                                          <p:spTgt spid="44"/>
+                                        </p:tgtEl>
+                                      </p:cBhvr>
+                                    </p:animEffect>
+                                  </p:childTnLst>
+                                </p:cTn>
+                              </p:par>
+                              <p:par>
+                                <p:cTn id="53" presetID="10" presetClass="entr" presetSubtype="0" fill="hold" nodeType="withEffect">
+                                  <p:stCondLst>
+                                    <p:cond delay="0"/>
+                                  </p:stCondLst>
+                                  <p:childTnLst>
+                                    <p:set>
+                                      <p:cBhvr>
+                                        <p:cTn id="54" dur="1" fill="hold">
+                                          <p:stCondLst>
+                                            <p:cond delay="0"/>
+                                          </p:stCondLst>
+                                        </p:cTn>
+                                        <p:tgtEl>
+                                          <p:spTgt spid="45"/>
+                                        </p:tgtEl>
+                                        <p:attrNameLst>
+                                          <p:attrName>style.visibility</p:attrName>
+                                        </p:attrNameLst>
+                                      </p:cBhvr>
+                                      <p:to>
+                                        <p:strVal val="visible"/>
+                                      </p:to>
+                                    </p:set>
+                                    <p:animEffect transition="in" filter="fade">
+                                      <p:cBhvr>
+                                        <p:cTn id="55" dur="500"/>
+                                        <p:tgtEl>
+                                          <p:spTgt spid="45"/>
+                                        </p:tgtEl>
+                                      </p:cBhvr>
+                                    </p:animEffect>
+                                  </p:childTnLst>
+                                </p:cTn>
+                              </p:par>
+                              <p:par>
+                                <p:cTn id="56" presetID="10" presetClass="entr" presetSubtype="0" fill="hold" nodeType="withEffect">
+                                  <p:stCondLst>
+                                    <p:cond delay="0"/>
+                                  </p:stCondLst>
+                                  <p:childTnLst>
+                                    <p:set>
+                                      <p:cBhvr>
+                                        <p:cTn id="57" dur="1" fill="hold">
+                                          <p:stCondLst>
+                                            <p:cond delay="0"/>
+                                          </p:stCondLst>
+                                        </p:cTn>
+                                        <p:tgtEl>
+                                          <p:spTgt spid="48"/>
+                                        </p:tgtEl>
+                                        <p:attrNameLst>
+                                          <p:attrName>style.visibility</p:attrName>
+                                        </p:attrNameLst>
+                                      </p:cBhvr>
+                                      <p:to>
+                                        <p:strVal val="visible"/>
+                                      </p:to>
+                                    </p:set>
+                                    <p:animEffect transition="in" filter="fade">
+                                      <p:cBhvr>
+                                        <p:cTn id="58" dur="500"/>
+                                        <p:tgtEl>
+                                          <p:spTgt spid="48"/>
+                                        </p:tgtEl>
+                                      </p:cBhvr>
+                                    </p:animEffect>
+                                  </p:childTnLst>
+                                </p:cTn>
+                              </p:par>
+                              <p:par>
+                                <p:cTn id="59" presetID="10" presetClass="entr" presetSubtype="0" fill="hold" grpId="0" nodeType="withEffect">
+                                  <p:stCondLst>
+                                    <p:cond delay="0"/>
+                                  </p:stCondLst>
+                                  <p:childTnLst>
+                                    <p:set>
+                                      <p:cBhvr>
+                                        <p:cTn id="60" dur="1" fill="hold">
+                                          <p:stCondLst>
+                                            <p:cond delay="0"/>
+                                          </p:stCondLst>
+                                        </p:cTn>
+                                        <p:tgtEl>
+                                          <p:spTgt spid="65"/>
+                                        </p:tgtEl>
+                                        <p:attrNameLst>
+                                          <p:attrName>style.visibility</p:attrName>
+                                        </p:attrNameLst>
+                                      </p:cBhvr>
+                                      <p:to>
+                                        <p:strVal val="visible"/>
+                                      </p:to>
+                                    </p:set>
+                                    <p:animEffect transition="in" filter="fade">
+                                      <p:cBhvr>
+                                        <p:cTn id="61" dur="500"/>
+                                        <p:tgtEl>
+                                          <p:spTgt spid="65"/>
+                                        </p:tgtEl>
+                                      </p:cBhvr>
+                                    </p:animEffect>
+                                  </p:childTnLst>
+                                </p:cTn>
+                              </p:par>
+                              <p:par>
+                                <p:cTn id="62" presetID="10" presetClass="entr" presetSubtype="0" fill="hold" nodeType="withEffect">
+                                  <p:stCondLst>
+                                    <p:cond delay="0"/>
+                                  </p:stCondLst>
+                                  <p:childTnLst>
+                                    <p:set>
+                                      <p:cBhvr>
+                                        <p:cTn id="63" dur="1" fill="hold">
+                                          <p:stCondLst>
+                                            <p:cond delay="0"/>
+                                          </p:stCondLst>
+                                        </p:cTn>
+                                        <p:tgtEl>
+                                          <p:spTgt spid="75"/>
+                                        </p:tgtEl>
+                                        <p:attrNameLst>
+                                          <p:attrName>style.visibility</p:attrName>
+                                        </p:attrNameLst>
+                                      </p:cBhvr>
+                                      <p:to>
+                                        <p:strVal val="visible"/>
+                                      </p:to>
+                                    </p:set>
+                                    <p:animEffect transition="in" filter="fade">
+                                      <p:cBhvr>
+                                        <p:cTn id="64" dur="500"/>
+                                        <p:tgtEl>
+                                          <p:spTgt spid="75"/>
+                                        </p:tgtEl>
+                                      </p:cBhvr>
+                                    </p:animEffect>
+                                  </p:childTnLst>
+                                </p:cTn>
+                              </p:par>
+                              <p:par>
+                                <p:cTn id="65" presetID="10" presetClass="entr" presetSubtype="0" fill="hold" grpId="0" nodeType="withEffect">
+                                  <p:stCondLst>
+                                    <p:cond delay="0"/>
+                                  </p:stCondLst>
+                                  <p:childTnLst>
+                                    <p:set>
+                                      <p:cBhvr>
+                                        <p:cTn id="66" dur="1" fill="hold">
+                                          <p:stCondLst>
+                                            <p:cond delay="0"/>
+                                          </p:stCondLst>
+                                        </p:cTn>
+                                        <p:tgtEl>
+                                          <p:spTgt spid="77"/>
+                                        </p:tgtEl>
+                                        <p:attrNameLst>
+                                          <p:attrName>style.visibility</p:attrName>
+                                        </p:attrNameLst>
+                                      </p:cBhvr>
+                                      <p:to>
+                                        <p:strVal val="visible"/>
+                                      </p:to>
+                                    </p:set>
+                                    <p:animEffect transition="in" filter="fade">
+                                      <p:cBhvr>
+                                        <p:cTn id="67" dur="500"/>
+                                        <p:tgtEl>
+                                          <p:spTgt spid="77"/>
+                                        </p:tgtEl>
+                                      </p:cBhvr>
+                                    </p:animEffect>
+                                  </p:childTnLst>
+                                </p:cTn>
+                              </p:par>
+                              <p:par>
+                                <p:cTn id="68" presetID="10" presetClass="entr" presetSubtype="0" fill="hold" grpId="0" nodeType="withEffect">
+                                  <p:stCondLst>
+                                    <p:cond delay="0"/>
+                                  </p:stCondLst>
+                                  <p:childTnLst>
+                                    <p:set>
+                                      <p:cBhvr>
+                                        <p:cTn id="69" dur="1" fill="hold">
+                                          <p:stCondLst>
+                                            <p:cond delay="0"/>
+                                          </p:stCondLst>
+                                        </p:cTn>
+                                        <p:tgtEl>
+                                          <p:spTgt spid="78"/>
+                                        </p:tgtEl>
+                                        <p:attrNameLst>
+                                          <p:attrName>style.visibility</p:attrName>
+                                        </p:attrNameLst>
+                                      </p:cBhvr>
+                                      <p:to>
+                                        <p:strVal val="visible"/>
+                                      </p:to>
+                                    </p:set>
+                                    <p:animEffect transition="in" filter="fade">
+                                      <p:cBhvr>
+                                        <p:cTn id="70" dur="500"/>
+                                        <p:tgtEl>
+                                          <p:spTgt spid="78"/>
+                                        </p:tgtEl>
+                                      </p:cBhvr>
+                                    </p:animEffect>
+                                  </p:childTnLst>
+                                </p:cTn>
+                              </p:par>
+                              <p:par>
+                                <p:cTn id="71" presetID="10" presetClass="entr" presetSubtype="0" fill="hold" nodeType="withEffect">
+                                  <p:stCondLst>
+                                    <p:cond delay="0"/>
+                                  </p:stCondLst>
+                                  <p:childTnLst>
+                                    <p:set>
+                                      <p:cBhvr>
+                                        <p:cTn id="72" dur="1" fill="hold">
+                                          <p:stCondLst>
+                                            <p:cond delay="0"/>
+                                          </p:stCondLst>
+                                        </p:cTn>
+                                        <p:tgtEl>
+                                          <p:spTgt spid="85"/>
+                                        </p:tgtEl>
+                                        <p:attrNameLst>
+                                          <p:attrName>style.visibility</p:attrName>
+                                        </p:attrNameLst>
+                                      </p:cBhvr>
+                                      <p:to>
+                                        <p:strVal val="visible"/>
+                                      </p:to>
+                                    </p:set>
+                                    <p:animEffect transition="in" filter="fade">
+                                      <p:cBhvr>
+                                        <p:cTn id="73" dur="500"/>
+                                        <p:tgtEl>
+                                          <p:spTgt spid="85"/>
+                                        </p:tgtEl>
+                                      </p:cBhvr>
+                                    </p:animEffect>
+                                  </p:childTnLst>
+                                </p:cTn>
+                              </p:par>
+                              <p:par>
+                                <p:cTn id="74" presetID="10" presetClass="entr" presetSubtype="0" fill="hold" nodeType="withEffect">
+                                  <p:stCondLst>
+                                    <p:cond delay="0"/>
+                                  </p:stCondLst>
+                                  <p:childTnLst>
+                                    <p:set>
+                                      <p:cBhvr>
+                                        <p:cTn id="75" dur="1" fill="hold">
+                                          <p:stCondLst>
+                                            <p:cond delay="0"/>
+                                          </p:stCondLst>
+                                        </p:cTn>
+                                        <p:tgtEl>
+                                          <p:spTgt spid="79"/>
+                                        </p:tgtEl>
+                                        <p:attrNameLst>
+                                          <p:attrName>style.visibility</p:attrName>
+                                        </p:attrNameLst>
+                                      </p:cBhvr>
+                                      <p:to>
+                                        <p:strVal val="visible"/>
+                                      </p:to>
+                                    </p:set>
+                                    <p:animEffect transition="in" filter="fade">
+                                      <p:cBhvr>
+                                        <p:cTn id="76" dur="500"/>
+                                        <p:tgtEl>
+                                          <p:spTgt spid="79"/>
+                                        </p:tgtEl>
+                                      </p:cBhvr>
+                                    </p:animEffect>
+                                  </p:childTnLst>
+                                </p:cTn>
+                              </p:par>
+                              <p:par>
+                                <p:cTn id="77" presetID="10" presetClass="entr" presetSubtype="0" fill="hold" nodeType="withEffect">
+                                  <p:stCondLst>
+                                    <p:cond delay="0"/>
+                                  </p:stCondLst>
+                                  <p:childTnLst>
+                                    <p:set>
+                                      <p:cBhvr>
+                                        <p:cTn id="78" dur="1" fill="hold">
+                                          <p:stCondLst>
+                                            <p:cond delay="0"/>
+                                          </p:stCondLst>
+                                        </p:cTn>
+                                        <p:tgtEl>
+                                          <p:spTgt spid="72"/>
+                                        </p:tgtEl>
+                                        <p:attrNameLst>
+                                          <p:attrName>style.visibility</p:attrName>
+                                        </p:attrNameLst>
+                                      </p:cBhvr>
+                                      <p:to>
+                                        <p:strVal val="visible"/>
+                                      </p:to>
+                                    </p:set>
+                                    <p:animEffect transition="in" filter="fade">
+                                      <p:cBhvr>
+                                        <p:cTn id="79" dur="500"/>
+                                        <p:tgtEl>
+                                          <p:spTgt spid="72"/>
+                                        </p:tgtEl>
+                                      </p:cBhvr>
+                                    </p:animEffect>
+                                  </p:childTnLst>
+                                </p:cTn>
+                              </p:par>
+                              <p:par>
+                                <p:cTn id="80" presetID="10" presetClass="entr" presetSubtype="0" fill="hold" nodeType="withEffect">
+                                  <p:stCondLst>
+                                    <p:cond delay="0"/>
+                                  </p:stCondLst>
+                                  <p:childTnLst>
+                                    <p:set>
+                                      <p:cBhvr>
+                                        <p:cTn id="81" dur="1" fill="hold">
+                                          <p:stCondLst>
+                                            <p:cond delay="0"/>
+                                          </p:stCondLst>
+                                        </p:cTn>
+                                        <p:tgtEl>
+                                          <p:spTgt spid="89"/>
+                                        </p:tgtEl>
+                                        <p:attrNameLst>
+                                          <p:attrName>style.visibility</p:attrName>
+                                        </p:attrNameLst>
+                                      </p:cBhvr>
+                                      <p:to>
+                                        <p:strVal val="visible"/>
+                                      </p:to>
+                                    </p:set>
+                                    <p:animEffect transition="in" filter="fade">
+                                      <p:cBhvr>
+                                        <p:cTn id="82" dur="500"/>
+                                        <p:tgtEl>
+                                          <p:spTgt spid="89"/>
+                                        </p:tgtEl>
+                                      </p:cBhvr>
+                                    </p:animEffect>
+                                  </p:childTnLst>
+                                </p:cTn>
+                              </p:par>
+                            </p:childTnLst>
+                          </p:cTn>
+                        </p:par>
+                      </p:childTnLst>
+                    </p:cTn>
+                  </p:par>
+                </p:childTnLst>
+              </p:cTn>
+              <p:prevCondLst>
+                <p:cond evt="onPrev" delay="0">
+                  <p:tgtEl>
+                    <p:sldTgt/>
+                  </p:tgtEl>
+                </p:cond>
+              </p:prevCondLst>
+              <p:nextCondLst>
+                <p:cond evt="onNext" delay="0">
+                  <p:tgtEl>
+                    <p:sldTgt/>
+                  </p:tgtEl>
+                </p:cond>
+              </p:nextCondLst>
+            </p:seq>
+          </p:childTnLst>
+        </p:cTn>
       </p:par>
     </p:tnLst>
+    <p:bldLst>
+      <p:bldP spid="63" grpId="0" animBg="1"/>
+      <p:bldP spid="18" grpId="0"/>
+      <p:bldP spid="22" grpId="0" animBg="1"/>
+      <p:bldP spid="23" grpId="0"/>
+      <p:bldP spid="24" grpId="0" animBg="1"/>
+      <p:bldP spid="30" grpId="0"/>
+      <p:bldP spid="32" grpId="0" animBg="1"/>
+      <p:bldP spid="37" grpId="0"/>
+      <p:bldP spid="44" grpId="0"/>
+      <p:bldP spid="65" grpId="0"/>
+      <p:bldP spid="77" grpId="0"/>
+      <p:bldP spid="78" grpId="0"/>
+    </p:bldLst>
   </p:timing>
 </p:sld>
 </file>

</xml_diff>